<commit_message>
POO - Cours complet
</commit_message>
<xml_diff>
--- a/02_CPP/01_POO/bts2_introduction-a-la-poo.pptx
+++ b/02_CPP/01_POO/bts2_introduction-a-la-poo.pptx
@@ -21,6 +21,12 @@
     <p:sldId id="270" r:id="rId15"/>
     <p:sldId id="271" r:id="rId16"/>
     <p:sldId id="272" r:id="rId17"/>
+    <p:sldId id="274" r:id="rId18"/>
+    <p:sldId id="273" r:id="rId19"/>
+    <p:sldId id="275" r:id="rId20"/>
+    <p:sldId id="276" r:id="rId21"/>
+    <p:sldId id="277" r:id="rId22"/>
+    <p:sldId id="278" r:id="rId23"/>
   </p:sldIdLst>
   <p:sldSz cx="12192000" cy="6858000"/>
   <p:notesSz cx="6858000" cy="9144000"/>
@@ -274,7 +280,7 @@
           <a:p>
             <a:fld id="{083AAB2B-B230-493E-BE8E-2C812F306802}" type="datetimeFigureOut">
               <a:rPr lang="fr-FR" smtClean="0"/>
-              <a:t>15/09/2020</a:t>
+              <a:t>18/09/2020</a:t>
             </a:fld>
             <a:endParaRPr lang="fr-FR"/>
           </a:p>
@@ -472,7 +478,7 @@
           <a:p>
             <a:fld id="{083AAB2B-B230-493E-BE8E-2C812F306802}" type="datetimeFigureOut">
               <a:rPr lang="fr-FR" smtClean="0"/>
-              <a:t>15/09/2020</a:t>
+              <a:t>18/09/2020</a:t>
             </a:fld>
             <a:endParaRPr lang="fr-FR"/>
           </a:p>
@@ -680,7 +686,7 @@
           <a:p>
             <a:fld id="{083AAB2B-B230-493E-BE8E-2C812F306802}" type="datetimeFigureOut">
               <a:rPr lang="fr-FR" smtClean="0"/>
-              <a:t>15/09/2020</a:t>
+              <a:t>18/09/2020</a:t>
             </a:fld>
             <a:endParaRPr lang="fr-FR"/>
           </a:p>
@@ -878,7 +884,7 @@
           <a:p>
             <a:fld id="{083AAB2B-B230-493E-BE8E-2C812F306802}" type="datetimeFigureOut">
               <a:rPr lang="fr-FR" smtClean="0"/>
-              <a:t>15/09/2020</a:t>
+              <a:t>18/09/2020</a:t>
             </a:fld>
             <a:endParaRPr lang="fr-FR"/>
           </a:p>
@@ -1153,7 +1159,7 @@
           <a:p>
             <a:fld id="{083AAB2B-B230-493E-BE8E-2C812F306802}" type="datetimeFigureOut">
               <a:rPr lang="fr-FR" smtClean="0"/>
-              <a:t>15/09/2020</a:t>
+              <a:t>18/09/2020</a:t>
             </a:fld>
             <a:endParaRPr lang="fr-FR"/>
           </a:p>
@@ -1418,7 +1424,7 @@
           <a:p>
             <a:fld id="{083AAB2B-B230-493E-BE8E-2C812F306802}" type="datetimeFigureOut">
               <a:rPr lang="fr-FR" smtClean="0"/>
-              <a:t>15/09/2020</a:t>
+              <a:t>18/09/2020</a:t>
             </a:fld>
             <a:endParaRPr lang="fr-FR"/>
           </a:p>
@@ -1830,7 +1836,7 @@
           <a:p>
             <a:fld id="{083AAB2B-B230-493E-BE8E-2C812F306802}" type="datetimeFigureOut">
               <a:rPr lang="fr-FR" smtClean="0"/>
-              <a:t>15/09/2020</a:t>
+              <a:t>18/09/2020</a:t>
             </a:fld>
             <a:endParaRPr lang="fr-FR"/>
           </a:p>
@@ -1971,7 +1977,7 @@
           <a:p>
             <a:fld id="{083AAB2B-B230-493E-BE8E-2C812F306802}" type="datetimeFigureOut">
               <a:rPr lang="fr-FR" smtClean="0"/>
-              <a:t>15/09/2020</a:t>
+              <a:t>18/09/2020</a:t>
             </a:fld>
             <a:endParaRPr lang="fr-FR"/>
           </a:p>
@@ -2084,7 +2090,7 @@
           <a:p>
             <a:fld id="{083AAB2B-B230-493E-BE8E-2C812F306802}" type="datetimeFigureOut">
               <a:rPr lang="fr-FR" smtClean="0"/>
-              <a:t>15/09/2020</a:t>
+              <a:t>18/09/2020</a:t>
             </a:fld>
             <a:endParaRPr lang="fr-FR"/>
           </a:p>
@@ -2395,7 +2401,7 @@
           <a:p>
             <a:fld id="{083AAB2B-B230-493E-BE8E-2C812F306802}" type="datetimeFigureOut">
               <a:rPr lang="fr-FR" smtClean="0"/>
-              <a:t>15/09/2020</a:t>
+              <a:t>18/09/2020</a:t>
             </a:fld>
             <a:endParaRPr lang="fr-FR"/>
           </a:p>
@@ -2683,7 +2689,7 @@
           <a:p>
             <a:fld id="{083AAB2B-B230-493E-BE8E-2C812F306802}" type="datetimeFigureOut">
               <a:rPr lang="fr-FR" smtClean="0"/>
-              <a:t>15/09/2020</a:t>
+              <a:t>18/09/2020</a:t>
             </a:fld>
             <a:endParaRPr lang="fr-FR"/>
           </a:p>
@@ -2924,7 +2930,7 @@
           <a:p>
             <a:fld id="{083AAB2B-B230-493E-BE8E-2C812F306802}" type="datetimeFigureOut">
               <a:rPr lang="fr-FR" smtClean="0"/>
-              <a:t>15/09/2020</a:t>
+              <a:t>18/09/2020</a:t>
             </a:fld>
             <a:endParaRPr lang="fr-FR"/>
           </a:p>
@@ -11489,6 +11495,1461 @@
 </p:sld>
 </file>
 
+<file path=ppt/slides/slide17.xml><?xml version="1.0" encoding="utf-8"?>
+<p:sld xmlns:a="http://schemas.openxmlformats.org/drawingml/2006/main" xmlns:r="http://schemas.openxmlformats.org/officeDocument/2006/relationships" xmlns:p="http://schemas.openxmlformats.org/presentationml/2006/main">
+  <p:cSld>
+    <p:spTree>
+      <p:nvGrpSpPr>
+        <p:cNvPr id="1" name=""/>
+        <p:cNvGrpSpPr/>
+        <p:nvPr/>
+      </p:nvGrpSpPr>
+      <p:grpSpPr>
+        <a:xfrm>
+          <a:off x="0" y="0"/>
+          <a:ext cx="0" cy="0"/>
+          <a:chOff x="0" y="0"/>
+          <a:chExt cx="0" cy="0"/>
+        </a:xfrm>
+      </p:grpSpPr>
+      <p:sp>
+        <p:nvSpPr>
+          <p:cNvPr id="2" name="Titre 1">
+            <a:extLst>
+              <a:ext uri="{FF2B5EF4-FFF2-40B4-BE49-F238E27FC236}">
+                <a16:creationId xmlns:a16="http://schemas.microsoft.com/office/drawing/2014/main" id="{EFD60704-57D3-47F5-B679-601D50BCCF9B}"/>
+              </a:ext>
+            </a:extLst>
+          </p:cNvPr>
+          <p:cNvSpPr>
+            <a:spLocks noGrp="1"/>
+          </p:cNvSpPr>
+          <p:nvPr>
+            <p:ph type="title"/>
+          </p:nvPr>
+        </p:nvSpPr>
+        <p:spPr/>
+        <p:txBody>
+          <a:bodyPr/>
+          <a:lstStyle/>
+          <a:p>
+            <a:r>
+              <a:rPr lang="fr-FR" dirty="0"/>
+              <a:t>Attribut </a:t>
+            </a:r>
+            <a:r>
+              <a:rPr lang="fr-FR" dirty="0" err="1"/>
+              <a:t>static</a:t>
+            </a:r>
+            <a:endParaRPr lang="fr-FR" dirty="0"/>
+          </a:p>
+        </p:txBody>
+      </p:sp>
+      <p:sp>
+        <p:nvSpPr>
+          <p:cNvPr id="3" name="Espace réservé du contenu 2">
+            <a:extLst>
+              <a:ext uri="{FF2B5EF4-FFF2-40B4-BE49-F238E27FC236}">
+                <a16:creationId xmlns:a16="http://schemas.microsoft.com/office/drawing/2014/main" id="{E35BF4FA-D8F4-46F1-9644-A4D731C1493C}"/>
+              </a:ext>
+            </a:extLst>
+          </p:cNvPr>
+          <p:cNvSpPr>
+            <a:spLocks noGrp="1"/>
+          </p:cNvSpPr>
+          <p:nvPr>
+            <p:ph idx="1"/>
+          </p:nvPr>
+        </p:nvSpPr>
+        <p:spPr/>
+        <p:txBody>
+          <a:bodyPr>
+            <a:normAutofit lnSpcReduction="10000"/>
+          </a:bodyPr>
+          <a:lstStyle/>
+          <a:p>
+            <a:pPr marL="0" indent="0">
+              <a:buNone/>
+            </a:pPr>
+            <a:r>
+              <a:rPr lang="fr-FR" dirty="0"/>
+              <a:t>Attribut partagé par tous les objets de la classe :</a:t>
+            </a:r>
+          </a:p>
+          <a:p>
+            <a:pPr marL="0" indent="0">
+              <a:buNone/>
+            </a:pPr>
+            <a:endParaRPr lang="en-US" sz="2400" b="0" dirty="0">
+              <a:solidFill>
+                <a:srgbClr val="D73A49"/>
+              </a:solidFill>
+              <a:effectLst/>
+              <a:latin typeface="Consolas" panose="020B0609020204030204" pitchFamily="49" charset="0"/>
+            </a:endParaRPr>
+          </a:p>
+          <a:p>
+            <a:pPr marL="0" indent="0">
+              <a:buNone/>
+            </a:pPr>
+            <a:r>
+              <a:rPr lang="en-US" sz="2400" b="0" dirty="0">
+                <a:solidFill>
+                  <a:srgbClr val="D73A49"/>
+                </a:solidFill>
+                <a:effectLst/>
+                <a:latin typeface="Consolas" panose="020B0609020204030204" pitchFamily="49" charset="0"/>
+              </a:rPr>
+              <a:t>class</a:t>
+            </a:r>
+            <a:r>
+              <a:rPr lang="en-US" sz="2400" b="0" dirty="0">
+                <a:solidFill>
+                  <a:srgbClr val="24292E"/>
+                </a:solidFill>
+                <a:effectLst/>
+                <a:latin typeface="Consolas" panose="020B0609020204030204" pitchFamily="49" charset="0"/>
+              </a:rPr>
+              <a:t> </a:t>
+            </a:r>
+            <a:r>
+              <a:rPr lang="en-US" sz="2400" b="0" dirty="0">
+                <a:solidFill>
+                  <a:srgbClr val="6F42C1"/>
+                </a:solidFill>
+                <a:effectLst/>
+                <a:latin typeface="Consolas" panose="020B0609020204030204" pitchFamily="49" charset="0"/>
+              </a:rPr>
+              <a:t>point</a:t>
+            </a:r>
+            <a:endParaRPr lang="en-US" sz="2400" b="0" dirty="0">
+              <a:solidFill>
+                <a:srgbClr val="24292E"/>
+              </a:solidFill>
+              <a:effectLst/>
+              <a:latin typeface="Consolas" panose="020B0609020204030204" pitchFamily="49" charset="0"/>
+            </a:endParaRPr>
+          </a:p>
+          <a:p>
+            <a:pPr marL="0" indent="0">
+              <a:buNone/>
+            </a:pPr>
+            <a:r>
+              <a:rPr lang="en-US" sz="2400" b="0" dirty="0">
+                <a:solidFill>
+                  <a:srgbClr val="24292E"/>
+                </a:solidFill>
+                <a:effectLst/>
+                <a:latin typeface="Consolas" panose="020B0609020204030204" pitchFamily="49" charset="0"/>
+              </a:rPr>
+              <a:t>{</a:t>
+            </a:r>
+          </a:p>
+          <a:p>
+            <a:pPr marL="0" indent="0">
+              <a:buNone/>
+            </a:pPr>
+            <a:r>
+              <a:rPr lang="en-US" sz="2400" b="0" dirty="0">
+                <a:solidFill>
+                  <a:srgbClr val="24292E"/>
+                </a:solidFill>
+                <a:effectLst/>
+                <a:latin typeface="Consolas" panose="020B0609020204030204" pitchFamily="49" charset="0"/>
+              </a:rPr>
+              <a:t>    </a:t>
+            </a:r>
+            <a:r>
+              <a:rPr lang="en-US" sz="2400" b="1" dirty="0">
+                <a:solidFill>
+                  <a:srgbClr val="D73A49"/>
+                </a:solidFill>
+                <a:effectLst/>
+                <a:latin typeface="Consolas" panose="020B0609020204030204" pitchFamily="49" charset="0"/>
+              </a:rPr>
+              <a:t>static</a:t>
+            </a:r>
+            <a:r>
+              <a:rPr lang="en-US" sz="2400" b="0" dirty="0">
+                <a:solidFill>
+                  <a:srgbClr val="24292E"/>
+                </a:solidFill>
+                <a:effectLst/>
+                <a:latin typeface="Consolas" panose="020B0609020204030204" pitchFamily="49" charset="0"/>
+              </a:rPr>
+              <a:t> </a:t>
+            </a:r>
+            <a:r>
+              <a:rPr lang="en-US" sz="2400" b="0" dirty="0">
+                <a:solidFill>
+                  <a:srgbClr val="D73A49"/>
+                </a:solidFill>
+                <a:effectLst/>
+                <a:latin typeface="Consolas" panose="020B0609020204030204" pitchFamily="49" charset="0"/>
+              </a:rPr>
+              <a:t>int</a:t>
+            </a:r>
+            <a:r>
+              <a:rPr lang="en-US" sz="2400" b="0" dirty="0">
+                <a:solidFill>
+                  <a:srgbClr val="24292E"/>
+                </a:solidFill>
+                <a:effectLst/>
+                <a:latin typeface="Consolas" panose="020B0609020204030204" pitchFamily="49" charset="0"/>
+              </a:rPr>
+              <a:t> x;</a:t>
+            </a:r>
+          </a:p>
+          <a:p>
+            <a:pPr marL="0" indent="0">
+              <a:buNone/>
+            </a:pPr>
+            <a:r>
+              <a:rPr lang="en-US" sz="2400" b="0" dirty="0">
+                <a:solidFill>
+                  <a:srgbClr val="24292E"/>
+                </a:solidFill>
+                <a:effectLst/>
+                <a:latin typeface="Consolas" panose="020B0609020204030204" pitchFamily="49" charset="0"/>
+              </a:rPr>
+              <a:t>    </a:t>
+            </a:r>
+            <a:r>
+              <a:rPr lang="en-US" sz="2400" b="0" dirty="0">
+                <a:solidFill>
+                  <a:srgbClr val="D73A49"/>
+                </a:solidFill>
+                <a:effectLst/>
+                <a:latin typeface="Consolas" panose="020B0609020204030204" pitchFamily="49" charset="0"/>
+              </a:rPr>
+              <a:t>int</a:t>
+            </a:r>
+            <a:r>
+              <a:rPr lang="en-US" sz="2400" b="0" dirty="0">
+                <a:solidFill>
+                  <a:srgbClr val="24292E"/>
+                </a:solidFill>
+                <a:effectLst/>
+                <a:latin typeface="Consolas" panose="020B0609020204030204" pitchFamily="49" charset="0"/>
+              </a:rPr>
+              <a:t> y;</a:t>
+            </a:r>
+          </a:p>
+          <a:p>
+            <a:pPr marL="0" indent="0">
+              <a:buNone/>
+            </a:pPr>
+            <a:r>
+              <a:rPr lang="en-US" sz="2400" b="0" dirty="0">
+                <a:solidFill>
+                  <a:srgbClr val="24292E"/>
+                </a:solidFill>
+                <a:effectLst/>
+                <a:latin typeface="Consolas" panose="020B0609020204030204" pitchFamily="49" charset="0"/>
+              </a:rPr>
+              <a:t>};</a:t>
+            </a:r>
+          </a:p>
+          <a:p>
+            <a:pPr marL="0" indent="0">
+              <a:buNone/>
+            </a:pPr>
+            <a:endParaRPr lang="en-US" sz="2400" b="0" dirty="0">
+              <a:solidFill>
+                <a:srgbClr val="24292E"/>
+              </a:solidFill>
+              <a:effectLst/>
+              <a:latin typeface="Consolas" panose="020B0609020204030204" pitchFamily="49" charset="0"/>
+            </a:endParaRPr>
+          </a:p>
+          <a:p>
+            <a:pPr marL="0" indent="0">
+              <a:buNone/>
+            </a:pPr>
+            <a:r>
+              <a:rPr lang="en-US" sz="2400" b="0" dirty="0">
+                <a:solidFill>
+                  <a:schemeClr val="bg1">
+                    <a:lumMod val="65000"/>
+                  </a:schemeClr>
+                </a:solidFill>
+                <a:effectLst/>
+                <a:latin typeface="Consolas" panose="020B0609020204030204" pitchFamily="49" charset="0"/>
+              </a:rPr>
+              <a:t>// Ne </a:t>
+            </a:r>
+            <a:r>
+              <a:rPr lang="en-US" sz="2400" b="0" dirty="0" err="1">
+                <a:solidFill>
+                  <a:schemeClr val="bg1">
+                    <a:lumMod val="65000"/>
+                  </a:schemeClr>
+                </a:solidFill>
+                <a:effectLst/>
+                <a:latin typeface="Consolas" panose="020B0609020204030204" pitchFamily="49" charset="0"/>
+              </a:rPr>
+              <a:t>s’initialise</a:t>
+            </a:r>
+            <a:r>
+              <a:rPr lang="en-US" sz="2400" b="0" dirty="0">
+                <a:solidFill>
+                  <a:schemeClr val="bg1">
+                    <a:lumMod val="65000"/>
+                  </a:schemeClr>
+                </a:solidFill>
+                <a:effectLst/>
+                <a:latin typeface="Consolas" panose="020B0609020204030204" pitchFamily="49" charset="0"/>
+              </a:rPr>
+              <a:t> </a:t>
+            </a:r>
+            <a:r>
+              <a:rPr lang="en-US" sz="2400" b="0" dirty="0" err="1">
+                <a:solidFill>
+                  <a:schemeClr val="bg1">
+                    <a:lumMod val="65000"/>
+                  </a:schemeClr>
+                </a:solidFill>
+                <a:effectLst/>
+                <a:latin typeface="Consolas" panose="020B0609020204030204" pitchFamily="49" charset="0"/>
+              </a:rPr>
+              <a:t>qu’à</a:t>
+            </a:r>
+            <a:r>
+              <a:rPr lang="en-US" sz="2400" b="0" dirty="0">
+                <a:solidFill>
+                  <a:schemeClr val="bg1">
+                    <a:lumMod val="65000"/>
+                  </a:schemeClr>
+                </a:solidFill>
+                <a:effectLst/>
+                <a:latin typeface="Consolas" panose="020B0609020204030204" pitchFamily="49" charset="0"/>
+              </a:rPr>
+              <a:t> </a:t>
+            </a:r>
+            <a:r>
+              <a:rPr lang="en-US" sz="2400" b="0" dirty="0" err="1">
+                <a:solidFill>
+                  <a:schemeClr val="bg1">
+                    <a:lumMod val="65000"/>
+                  </a:schemeClr>
+                </a:solidFill>
+                <a:effectLst/>
+                <a:latin typeface="Consolas" panose="020B0609020204030204" pitchFamily="49" charset="0"/>
+              </a:rPr>
+              <a:t>l’extérieur</a:t>
+            </a:r>
+            <a:r>
+              <a:rPr lang="en-US" sz="2400" b="0" dirty="0">
+                <a:solidFill>
+                  <a:schemeClr val="bg1">
+                    <a:lumMod val="65000"/>
+                  </a:schemeClr>
+                </a:solidFill>
+                <a:effectLst/>
+                <a:latin typeface="Consolas" panose="020B0609020204030204" pitchFamily="49" charset="0"/>
+              </a:rPr>
+              <a:t> de la </a:t>
+            </a:r>
+            <a:r>
+              <a:rPr lang="en-US" sz="2400" b="0" dirty="0" err="1">
+                <a:solidFill>
+                  <a:schemeClr val="bg1">
+                    <a:lumMod val="65000"/>
+                  </a:schemeClr>
+                </a:solidFill>
+                <a:effectLst/>
+                <a:latin typeface="Consolas" panose="020B0609020204030204" pitchFamily="49" charset="0"/>
+              </a:rPr>
+              <a:t>classe</a:t>
+            </a:r>
+            <a:endParaRPr lang="en-US" sz="2400" b="0" dirty="0">
+              <a:solidFill>
+                <a:schemeClr val="bg1">
+                  <a:lumMod val="65000"/>
+                </a:schemeClr>
+              </a:solidFill>
+              <a:effectLst/>
+              <a:latin typeface="Consolas" panose="020B0609020204030204" pitchFamily="49" charset="0"/>
+            </a:endParaRPr>
+          </a:p>
+          <a:p>
+            <a:pPr marL="0" indent="0">
+              <a:buNone/>
+            </a:pPr>
+            <a:r>
+              <a:rPr lang="en-US" sz="2400" b="0" dirty="0">
+                <a:solidFill>
+                  <a:srgbClr val="D73A49"/>
+                </a:solidFill>
+                <a:effectLst/>
+                <a:latin typeface="Consolas" panose="020B0609020204030204" pitchFamily="49" charset="0"/>
+              </a:rPr>
+              <a:t>int</a:t>
+            </a:r>
+            <a:r>
+              <a:rPr lang="en-US" sz="2400" b="0" dirty="0">
+                <a:solidFill>
+                  <a:srgbClr val="24292E"/>
+                </a:solidFill>
+                <a:effectLst/>
+                <a:latin typeface="Consolas" panose="020B0609020204030204" pitchFamily="49" charset="0"/>
+              </a:rPr>
+              <a:t> </a:t>
+            </a:r>
+            <a:r>
+              <a:rPr lang="en-US" sz="2400" b="0" dirty="0">
+                <a:solidFill>
+                  <a:srgbClr val="6F42C1"/>
+                </a:solidFill>
+                <a:effectLst/>
+                <a:latin typeface="Consolas" panose="020B0609020204030204" pitchFamily="49" charset="0"/>
+              </a:rPr>
+              <a:t>point</a:t>
+            </a:r>
+            <a:r>
+              <a:rPr lang="en-US" sz="2400" b="0" dirty="0">
+                <a:solidFill>
+                  <a:srgbClr val="24292E"/>
+                </a:solidFill>
+                <a:effectLst/>
+                <a:latin typeface="Consolas" panose="020B0609020204030204" pitchFamily="49" charset="0"/>
+              </a:rPr>
+              <a:t>::x </a:t>
+            </a:r>
+            <a:r>
+              <a:rPr lang="en-US" sz="2400" b="0" dirty="0">
+                <a:solidFill>
+                  <a:srgbClr val="D73A49"/>
+                </a:solidFill>
+                <a:effectLst/>
+                <a:latin typeface="Consolas" panose="020B0609020204030204" pitchFamily="49" charset="0"/>
+              </a:rPr>
+              <a:t>=</a:t>
+            </a:r>
+            <a:r>
+              <a:rPr lang="en-US" sz="2400" b="0" dirty="0">
+                <a:solidFill>
+                  <a:srgbClr val="24292E"/>
+                </a:solidFill>
+                <a:effectLst/>
+                <a:latin typeface="Consolas" panose="020B0609020204030204" pitchFamily="49" charset="0"/>
+              </a:rPr>
+              <a:t> </a:t>
+            </a:r>
+            <a:r>
+              <a:rPr lang="en-US" sz="2400" b="0" dirty="0">
+                <a:solidFill>
+                  <a:srgbClr val="005CC5"/>
+                </a:solidFill>
+                <a:effectLst/>
+                <a:latin typeface="Consolas" panose="020B0609020204030204" pitchFamily="49" charset="0"/>
+              </a:rPr>
+              <a:t>1</a:t>
+            </a:r>
+            <a:r>
+              <a:rPr lang="en-US" sz="2400" b="0" dirty="0">
+                <a:solidFill>
+                  <a:srgbClr val="24292E"/>
+                </a:solidFill>
+                <a:effectLst/>
+                <a:latin typeface="Consolas" panose="020B0609020204030204" pitchFamily="49" charset="0"/>
+              </a:rPr>
+              <a:t>; </a:t>
+            </a:r>
+          </a:p>
+          <a:p>
+            <a:pPr marL="0" indent="0">
+              <a:buNone/>
+            </a:pPr>
+            <a:endParaRPr lang="fr-FR" dirty="0"/>
+          </a:p>
+        </p:txBody>
+      </p:sp>
+      <p:pic>
+        <p:nvPicPr>
+          <p:cNvPr id="5" name="Image 4">
+            <a:extLst>
+              <a:ext uri="{FF2B5EF4-FFF2-40B4-BE49-F238E27FC236}">
+                <a16:creationId xmlns:a16="http://schemas.microsoft.com/office/drawing/2014/main" id="{B671842E-9B74-4C27-BE47-DD987E82B7D9}"/>
+              </a:ext>
+            </a:extLst>
+          </p:cNvPr>
+          <p:cNvPicPr>
+            <a:picLocks noChangeAspect="1"/>
+          </p:cNvPicPr>
+          <p:nvPr/>
+        </p:nvPicPr>
+        <p:blipFill>
+          <a:blip r:embed="rId2"/>
+          <a:stretch>
+            <a:fillRect/>
+          </a:stretch>
+        </p:blipFill>
+        <p:spPr>
+          <a:xfrm>
+            <a:off x="6260427" y="2531472"/>
+            <a:ext cx="4861981" cy="2293819"/>
+          </a:xfrm>
+          <a:prstGeom prst="rect">
+            <a:avLst/>
+          </a:prstGeom>
+        </p:spPr>
+      </p:pic>
+    </p:spTree>
+    <p:extLst>
+      <p:ext uri="{BB962C8B-B14F-4D97-AF65-F5344CB8AC3E}">
+        <p14:creationId xmlns:p14="http://schemas.microsoft.com/office/powerpoint/2010/main" val="1706968406"/>
+      </p:ext>
+    </p:extLst>
+  </p:cSld>
+  <p:clrMapOvr>
+    <a:masterClrMapping/>
+  </p:clrMapOvr>
+  <p:timing>
+    <p:tnLst>
+      <p:par>
+        <p:cTn id="1" dur="indefinite" restart="never" nodeType="tmRoot">
+          <p:childTnLst>
+            <p:seq concurrent="1" nextAc="seek">
+              <p:cTn id="2" dur="indefinite" nodeType="mainSeq">
+                <p:childTnLst>
+                  <p:par>
+                    <p:cTn id="3" fill="hold">
+                      <p:stCondLst>
+                        <p:cond delay="indefinite"/>
+                      </p:stCondLst>
+                      <p:childTnLst>
+                        <p:par>
+                          <p:cTn id="4" fill="hold">
+                            <p:stCondLst>
+                              <p:cond delay="0"/>
+                            </p:stCondLst>
+                            <p:childTnLst>
+                              <p:par>
+                                <p:cTn id="5" presetID="2" presetClass="entr" presetSubtype="8" fill="hold" nodeType="clickEffect">
+                                  <p:stCondLst>
+                                    <p:cond delay="0"/>
+                                  </p:stCondLst>
+                                  <p:childTnLst>
+                                    <p:set>
+                                      <p:cBhvr>
+                                        <p:cTn id="6" dur="1" fill="hold">
+                                          <p:stCondLst>
+                                            <p:cond delay="0"/>
+                                          </p:stCondLst>
+                                        </p:cTn>
+                                        <p:tgtEl>
+                                          <p:spTgt spid="3">
+                                            <p:txEl>
+                                              <p:pRg st="8" end="8"/>
+                                            </p:txEl>
+                                          </p:spTgt>
+                                        </p:tgtEl>
+                                        <p:attrNameLst>
+                                          <p:attrName>style.visibility</p:attrName>
+                                        </p:attrNameLst>
+                                      </p:cBhvr>
+                                      <p:to>
+                                        <p:strVal val="visible"/>
+                                      </p:to>
+                                    </p:set>
+                                    <p:anim calcmode="lin" valueType="num">
+                                      <p:cBhvr additive="base">
+                                        <p:cTn id="7" dur="500" fill="hold"/>
+                                        <p:tgtEl>
+                                          <p:spTgt spid="3">
+                                            <p:txEl>
+                                              <p:pRg st="8" end="8"/>
+                                            </p:txEl>
+                                          </p:spTgt>
+                                        </p:tgtEl>
+                                        <p:attrNameLst>
+                                          <p:attrName>ppt_x</p:attrName>
+                                        </p:attrNameLst>
+                                      </p:cBhvr>
+                                      <p:tavLst>
+                                        <p:tav tm="0">
+                                          <p:val>
+                                            <p:strVal val="0-#ppt_w/2"/>
+                                          </p:val>
+                                        </p:tav>
+                                        <p:tav tm="100000">
+                                          <p:val>
+                                            <p:strVal val="#ppt_x"/>
+                                          </p:val>
+                                        </p:tav>
+                                      </p:tavLst>
+                                    </p:anim>
+                                    <p:anim calcmode="lin" valueType="num">
+                                      <p:cBhvr additive="base">
+                                        <p:cTn id="8" dur="500" fill="hold"/>
+                                        <p:tgtEl>
+                                          <p:spTgt spid="3">
+                                            <p:txEl>
+                                              <p:pRg st="8" end="8"/>
+                                            </p:txEl>
+                                          </p:spTgt>
+                                        </p:tgtEl>
+                                        <p:attrNameLst>
+                                          <p:attrName>ppt_y</p:attrName>
+                                        </p:attrNameLst>
+                                      </p:cBhvr>
+                                      <p:tavLst>
+                                        <p:tav tm="0">
+                                          <p:val>
+                                            <p:strVal val="#ppt_y"/>
+                                          </p:val>
+                                        </p:tav>
+                                        <p:tav tm="100000">
+                                          <p:val>
+                                            <p:strVal val="#ppt_y"/>
+                                          </p:val>
+                                        </p:tav>
+                                      </p:tavLst>
+                                    </p:anim>
+                                  </p:childTnLst>
+                                </p:cTn>
+                              </p:par>
+                              <p:par>
+                                <p:cTn id="9" presetID="2" presetClass="entr" presetSubtype="8" fill="hold" nodeType="withEffect">
+                                  <p:stCondLst>
+                                    <p:cond delay="0"/>
+                                  </p:stCondLst>
+                                  <p:childTnLst>
+                                    <p:set>
+                                      <p:cBhvr>
+                                        <p:cTn id="10" dur="1" fill="hold">
+                                          <p:stCondLst>
+                                            <p:cond delay="0"/>
+                                          </p:stCondLst>
+                                        </p:cTn>
+                                        <p:tgtEl>
+                                          <p:spTgt spid="3">
+                                            <p:txEl>
+                                              <p:pRg st="9" end="9"/>
+                                            </p:txEl>
+                                          </p:spTgt>
+                                        </p:tgtEl>
+                                        <p:attrNameLst>
+                                          <p:attrName>style.visibility</p:attrName>
+                                        </p:attrNameLst>
+                                      </p:cBhvr>
+                                      <p:to>
+                                        <p:strVal val="visible"/>
+                                      </p:to>
+                                    </p:set>
+                                    <p:anim calcmode="lin" valueType="num">
+                                      <p:cBhvr additive="base">
+                                        <p:cTn id="11" dur="500" fill="hold"/>
+                                        <p:tgtEl>
+                                          <p:spTgt spid="3">
+                                            <p:txEl>
+                                              <p:pRg st="9" end="9"/>
+                                            </p:txEl>
+                                          </p:spTgt>
+                                        </p:tgtEl>
+                                        <p:attrNameLst>
+                                          <p:attrName>ppt_x</p:attrName>
+                                        </p:attrNameLst>
+                                      </p:cBhvr>
+                                      <p:tavLst>
+                                        <p:tav tm="0">
+                                          <p:val>
+                                            <p:strVal val="0-#ppt_w/2"/>
+                                          </p:val>
+                                        </p:tav>
+                                        <p:tav tm="100000">
+                                          <p:val>
+                                            <p:strVal val="#ppt_x"/>
+                                          </p:val>
+                                        </p:tav>
+                                      </p:tavLst>
+                                    </p:anim>
+                                    <p:anim calcmode="lin" valueType="num">
+                                      <p:cBhvr additive="base">
+                                        <p:cTn id="12" dur="500" fill="hold"/>
+                                        <p:tgtEl>
+                                          <p:spTgt spid="3">
+                                            <p:txEl>
+                                              <p:pRg st="9" end="9"/>
+                                            </p:txEl>
+                                          </p:spTgt>
+                                        </p:tgtEl>
+                                        <p:attrNameLst>
+                                          <p:attrName>ppt_y</p:attrName>
+                                        </p:attrNameLst>
+                                      </p:cBhvr>
+                                      <p:tavLst>
+                                        <p:tav tm="0">
+                                          <p:val>
+                                            <p:strVal val="#ppt_y"/>
+                                          </p:val>
+                                        </p:tav>
+                                        <p:tav tm="100000">
+                                          <p:val>
+                                            <p:strVal val="#ppt_y"/>
+                                          </p:val>
+                                        </p:tav>
+                                      </p:tavLst>
+                                    </p:anim>
+                                  </p:childTnLst>
+                                </p:cTn>
+                              </p:par>
+                            </p:childTnLst>
+                          </p:cTn>
+                        </p:par>
+                      </p:childTnLst>
+                    </p:cTn>
+                  </p:par>
+                  <p:par>
+                    <p:cTn id="13" fill="hold">
+                      <p:stCondLst>
+                        <p:cond delay="indefinite"/>
+                      </p:stCondLst>
+                      <p:childTnLst>
+                        <p:par>
+                          <p:cTn id="14" fill="hold">
+                            <p:stCondLst>
+                              <p:cond delay="0"/>
+                            </p:stCondLst>
+                            <p:childTnLst>
+                              <p:par>
+                                <p:cTn id="15" presetID="2" presetClass="entr" presetSubtype="2" fill="hold" nodeType="clickEffect">
+                                  <p:stCondLst>
+                                    <p:cond delay="0"/>
+                                  </p:stCondLst>
+                                  <p:childTnLst>
+                                    <p:set>
+                                      <p:cBhvr>
+                                        <p:cTn id="16" dur="1" fill="hold">
+                                          <p:stCondLst>
+                                            <p:cond delay="0"/>
+                                          </p:stCondLst>
+                                        </p:cTn>
+                                        <p:tgtEl>
+                                          <p:spTgt spid="5"/>
+                                        </p:tgtEl>
+                                        <p:attrNameLst>
+                                          <p:attrName>style.visibility</p:attrName>
+                                        </p:attrNameLst>
+                                      </p:cBhvr>
+                                      <p:to>
+                                        <p:strVal val="visible"/>
+                                      </p:to>
+                                    </p:set>
+                                    <p:anim calcmode="lin" valueType="num">
+                                      <p:cBhvr additive="base">
+                                        <p:cTn id="17" dur="500" fill="hold"/>
+                                        <p:tgtEl>
+                                          <p:spTgt spid="5"/>
+                                        </p:tgtEl>
+                                        <p:attrNameLst>
+                                          <p:attrName>ppt_x</p:attrName>
+                                        </p:attrNameLst>
+                                      </p:cBhvr>
+                                      <p:tavLst>
+                                        <p:tav tm="0">
+                                          <p:val>
+                                            <p:strVal val="1+#ppt_w/2"/>
+                                          </p:val>
+                                        </p:tav>
+                                        <p:tav tm="100000">
+                                          <p:val>
+                                            <p:strVal val="#ppt_x"/>
+                                          </p:val>
+                                        </p:tav>
+                                      </p:tavLst>
+                                    </p:anim>
+                                    <p:anim calcmode="lin" valueType="num">
+                                      <p:cBhvr additive="base">
+                                        <p:cTn id="18" dur="500" fill="hold"/>
+                                        <p:tgtEl>
+                                          <p:spTgt spid="5"/>
+                                        </p:tgtEl>
+                                        <p:attrNameLst>
+                                          <p:attrName>ppt_y</p:attrName>
+                                        </p:attrNameLst>
+                                      </p:cBhvr>
+                                      <p:tavLst>
+                                        <p:tav tm="0">
+                                          <p:val>
+                                            <p:strVal val="#ppt_y"/>
+                                          </p:val>
+                                        </p:tav>
+                                        <p:tav tm="100000">
+                                          <p:val>
+                                            <p:strVal val="#ppt_y"/>
+                                          </p:val>
+                                        </p:tav>
+                                      </p:tavLst>
+                                    </p:anim>
+                                  </p:childTnLst>
+                                </p:cTn>
+                              </p:par>
+                            </p:childTnLst>
+                          </p:cTn>
+                        </p:par>
+                      </p:childTnLst>
+                    </p:cTn>
+                  </p:par>
+                </p:childTnLst>
+              </p:cTn>
+              <p:prevCondLst>
+                <p:cond evt="onPrev" delay="0">
+                  <p:tgtEl>
+                    <p:sldTgt/>
+                  </p:tgtEl>
+                </p:cond>
+              </p:prevCondLst>
+              <p:nextCondLst>
+                <p:cond evt="onNext" delay="0">
+                  <p:tgtEl>
+                    <p:sldTgt/>
+                  </p:tgtEl>
+                </p:cond>
+              </p:nextCondLst>
+            </p:seq>
+          </p:childTnLst>
+        </p:cTn>
+      </p:par>
+    </p:tnLst>
+  </p:timing>
+</p:sld>
+</file>
+
+<file path=ppt/slides/slide18.xml><?xml version="1.0" encoding="utf-8"?>
+<p:sld xmlns:a="http://schemas.openxmlformats.org/drawingml/2006/main" xmlns:r="http://schemas.openxmlformats.org/officeDocument/2006/relationships" xmlns:p="http://schemas.openxmlformats.org/presentationml/2006/main">
+  <p:cSld>
+    <p:spTree>
+      <p:nvGrpSpPr>
+        <p:cNvPr id="1" name=""/>
+        <p:cNvGrpSpPr/>
+        <p:nvPr/>
+      </p:nvGrpSpPr>
+      <p:grpSpPr>
+        <a:xfrm>
+          <a:off x="0" y="0"/>
+          <a:ext cx="0" cy="0"/>
+          <a:chOff x="0" y="0"/>
+          <a:chExt cx="0" cy="0"/>
+        </a:xfrm>
+      </p:grpSpPr>
+      <p:sp>
+        <p:nvSpPr>
+          <p:cNvPr id="2" name="Titre 1">
+            <a:extLst>
+              <a:ext uri="{FF2B5EF4-FFF2-40B4-BE49-F238E27FC236}">
+                <a16:creationId xmlns:a16="http://schemas.microsoft.com/office/drawing/2014/main" id="{2179EEE0-D2BF-4895-A24C-DA0463974DF1}"/>
+              </a:ext>
+            </a:extLst>
+          </p:cNvPr>
+          <p:cNvSpPr>
+            <a:spLocks noGrp="1"/>
+          </p:cNvSpPr>
+          <p:nvPr>
+            <p:ph type="title"/>
+          </p:nvPr>
+        </p:nvSpPr>
+        <p:spPr/>
+        <p:txBody>
+          <a:bodyPr/>
+          <a:lstStyle/>
+          <a:p>
+            <a:r>
+              <a:rPr lang="fr-FR" dirty="0"/>
+              <a:t>Destructeur</a:t>
+            </a:r>
+          </a:p>
+        </p:txBody>
+      </p:sp>
+      <p:sp>
+        <p:nvSpPr>
+          <p:cNvPr id="3" name="Espace réservé du contenu 2">
+            <a:extLst>
+              <a:ext uri="{FF2B5EF4-FFF2-40B4-BE49-F238E27FC236}">
+                <a16:creationId xmlns:a16="http://schemas.microsoft.com/office/drawing/2014/main" id="{79BC0EB5-6F63-407E-A742-0D5E087D1B24}"/>
+              </a:ext>
+            </a:extLst>
+          </p:cNvPr>
+          <p:cNvSpPr>
+            <a:spLocks noGrp="1"/>
+          </p:cNvSpPr>
+          <p:nvPr>
+            <p:ph idx="1"/>
+          </p:nvPr>
+        </p:nvSpPr>
+        <p:spPr/>
+        <p:txBody>
+          <a:bodyPr>
+            <a:normAutofit/>
+          </a:bodyPr>
+          <a:lstStyle/>
+          <a:p>
+            <a:pPr marL="0" indent="0" algn="l">
+              <a:buNone/>
+            </a:pPr>
+            <a:r>
+              <a:rPr lang="fr-FR" sz="2400" dirty="0">
+                <a:latin typeface="Calibri" panose="020F0502020204030204" pitchFamily="34" charset="0"/>
+              </a:rPr>
+              <a:t>Un </a:t>
+            </a:r>
+            <a:r>
+              <a:rPr lang="fr-FR" sz="2400" b="1" dirty="0">
+                <a:latin typeface="Calibri" panose="020F0502020204030204" pitchFamily="34" charset="0"/>
+              </a:rPr>
+              <a:t>d</a:t>
+            </a:r>
+            <a:r>
+              <a:rPr lang="fr-FR" sz="2400" b="1" i="0" u="none" strike="noStrike" baseline="0" dirty="0">
+                <a:latin typeface="Calibri" panose="020F0502020204030204" pitchFamily="34" charset="0"/>
+              </a:rPr>
+              <a:t>estructeur </a:t>
+            </a:r>
+            <a:r>
+              <a:rPr lang="fr-FR" sz="2400" b="0" i="0" u="none" strike="noStrike" baseline="0" dirty="0">
+                <a:latin typeface="Calibri" panose="020F0502020204030204" pitchFamily="34" charset="0"/>
+              </a:rPr>
+              <a:t>est une fonction membre qui est automatiquement appelée au moment de la "destruction" d’un objet, avant la libération de </a:t>
+            </a:r>
+            <a:r>
+              <a:rPr lang="fr-FR" sz="2400" dirty="0">
+                <a:latin typeface="Calibri" panose="020F0502020204030204" pitchFamily="34" charset="0"/>
+              </a:rPr>
+              <a:t>son </a:t>
+            </a:r>
+            <a:r>
+              <a:rPr lang="fr-FR" sz="2400" b="0" i="0" u="none" strike="noStrike" baseline="0" dirty="0">
+                <a:latin typeface="Calibri" panose="020F0502020204030204" pitchFamily="34" charset="0"/>
+              </a:rPr>
+              <a:t>espace mémoire :</a:t>
+            </a:r>
+          </a:p>
+          <a:p>
+            <a:pPr marL="0" indent="0" algn="l">
+              <a:buNone/>
+            </a:pPr>
+            <a:endParaRPr lang="fr-FR" sz="2400" dirty="0">
+              <a:latin typeface="Calibri" panose="020F0502020204030204" pitchFamily="34" charset="0"/>
+            </a:endParaRPr>
+          </a:p>
+          <a:p>
+            <a:pPr algn="l"/>
+            <a:r>
+              <a:rPr lang="fr-FR" sz="2400" b="0" i="0" u="none" strike="noStrike" baseline="0" dirty="0">
+                <a:latin typeface="Calibri" panose="020F0502020204030204" pitchFamily="34" charset="0"/>
+              </a:rPr>
+              <a:t>à la fin du bloc ou de la fonction pour les objets automatiques</a:t>
+            </a:r>
+          </a:p>
+          <a:p>
+            <a:pPr algn="l"/>
+            <a:r>
+              <a:rPr lang="fr-FR" sz="2400" b="0" i="0" u="none" strike="noStrike" baseline="0" dirty="0">
+                <a:latin typeface="Calibri" panose="020F0502020204030204" pitchFamily="34" charset="0"/>
+              </a:rPr>
+              <a:t>à la fin du programme pour les objets statiques, </a:t>
+            </a:r>
+          </a:p>
+          <a:p>
+            <a:r>
+              <a:rPr lang="fr-FR" sz="2400" b="0" i="0" u="none" strike="noStrike" baseline="0" dirty="0">
+                <a:latin typeface="Calibri" panose="020F0502020204030204" pitchFamily="34" charset="0"/>
+              </a:rPr>
+              <a:t>à l'aide de l'instruction </a:t>
+            </a:r>
+            <a:r>
+              <a:rPr lang="fr-FR" sz="2400" b="0" dirty="0" err="1">
+                <a:solidFill>
+                  <a:srgbClr val="D73A49"/>
+                </a:solidFill>
+                <a:effectLst/>
+                <a:latin typeface="Consolas" panose="020B0609020204030204" pitchFamily="49" charset="0"/>
+              </a:rPr>
+              <a:t>delete</a:t>
+            </a:r>
+            <a:r>
+              <a:rPr lang="fr-FR" sz="1600" dirty="0">
+                <a:solidFill>
+                  <a:srgbClr val="24292E"/>
+                </a:solidFill>
+                <a:latin typeface="Consolas" panose="020B0609020204030204" pitchFamily="49" charset="0"/>
+              </a:rPr>
+              <a:t> </a:t>
+            </a:r>
+            <a:r>
+              <a:rPr lang="fr-FR" sz="2400" b="0" i="0" u="none" strike="noStrike" baseline="0" dirty="0">
+                <a:latin typeface="Calibri" panose="020F0502020204030204" pitchFamily="34" charset="0"/>
+              </a:rPr>
+              <a:t>ou à la fin du bloc ou de la                             fonction pour les objets dynamiques</a:t>
+            </a:r>
+          </a:p>
+          <a:p>
+            <a:endParaRPr lang="fr-FR" sz="4400" dirty="0"/>
+          </a:p>
+        </p:txBody>
+      </p:sp>
+      <p:pic>
+        <p:nvPicPr>
+          <p:cNvPr id="1026" name="Picture 2" descr="Encyclopédie - Destructeur (le) (Asgard) - Marvel-World.com">
+            <a:extLst>
+              <a:ext uri="{FF2B5EF4-FFF2-40B4-BE49-F238E27FC236}">
+                <a16:creationId xmlns:a16="http://schemas.microsoft.com/office/drawing/2014/main" id="{6A57C6E4-799F-42CB-AEAC-9ACFE501DB1F}"/>
+              </a:ext>
+            </a:extLst>
+          </p:cNvPr>
+          <p:cNvPicPr>
+            <a:picLocks noChangeAspect="1" noChangeArrowheads="1"/>
+          </p:cNvPicPr>
+          <p:nvPr/>
+        </p:nvPicPr>
+        <p:blipFill>
+          <a:blip r:embed="rId2">
+            <a:extLst>
+              <a:ext uri="{28A0092B-C50C-407E-A947-70E740481C1C}">
+                <a14:useLocalDpi xmlns:a14="http://schemas.microsoft.com/office/drawing/2010/main" val="0"/>
+              </a:ext>
+            </a:extLst>
+          </a:blip>
+          <a:srcRect/>
+          <a:stretch>
+            <a:fillRect/>
+          </a:stretch>
+        </p:blipFill>
+        <p:spPr bwMode="auto">
+          <a:xfrm>
+            <a:off x="9530773" y="3059979"/>
+            <a:ext cx="1905000" cy="3324225"/>
+          </a:xfrm>
+          <a:prstGeom prst="rect">
+            <a:avLst/>
+          </a:prstGeom>
+          <a:noFill/>
+          <a:extLst>
+            <a:ext uri="{909E8E84-426E-40DD-AFC4-6F175D3DCCD1}">
+              <a14:hiddenFill xmlns:a14="http://schemas.microsoft.com/office/drawing/2010/main">
+                <a:solidFill>
+                  <a:srgbClr val="FFFFFF"/>
+                </a:solidFill>
+              </a14:hiddenFill>
+            </a:ext>
+          </a:extLst>
+        </p:spPr>
+      </p:pic>
+    </p:spTree>
+    <p:extLst>
+      <p:ext uri="{BB962C8B-B14F-4D97-AF65-F5344CB8AC3E}">
+        <p14:creationId xmlns:p14="http://schemas.microsoft.com/office/powerpoint/2010/main" val="2041747410"/>
+      </p:ext>
+    </p:extLst>
+  </p:cSld>
+  <p:clrMapOvr>
+    <a:masterClrMapping/>
+  </p:clrMapOvr>
+</p:sld>
+</file>
+
+<file path=ppt/slides/slide19.xml><?xml version="1.0" encoding="utf-8"?>
+<p:sld xmlns:a="http://schemas.openxmlformats.org/drawingml/2006/main" xmlns:r="http://schemas.openxmlformats.org/officeDocument/2006/relationships" xmlns:p="http://schemas.openxmlformats.org/presentationml/2006/main">
+  <p:cSld>
+    <p:spTree>
+      <p:nvGrpSpPr>
+        <p:cNvPr id="1" name=""/>
+        <p:cNvGrpSpPr/>
+        <p:nvPr/>
+      </p:nvGrpSpPr>
+      <p:grpSpPr>
+        <a:xfrm>
+          <a:off x="0" y="0"/>
+          <a:ext cx="0" cy="0"/>
+          <a:chOff x="0" y="0"/>
+          <a:chExt cx="0" cy="0"/>
+        </a:xfrm>
+      </p:grpSpPr>
+      <p:sp>
+        <p:nvSpPr>
+          <p:cNvPr id="3" name="Espace réservé du contenu 2">
+            <a:extLst>
+              <a:ext uri="{FF2B5EF4-FFF2-40B4-BE49-F238E27FC236}">
+                <a16:creationId xmlns:a16="http://schemas.microsoft.com/office/drawing/2014/main" id="{A41F34DA-DB20-47C7-B42D-04BDED91DC6F}"/>
+              </a:ext>
+            </a:extLst>
+          </p:cNvPr>
+          <p:cNvSpPr>
+            <a:spLocks noGrp="1"/>
+          </p:cNvSpPr>
+          <p:nvPr>
+            <p:ph idx="1"/>
+          </p:nvPr>
+        </p:nvSpPr>
+        <p:spPr>
+          <a:xfrm>
+            <a:off x="838200" y="572655"/>
+            <a:ext cx="10515600" cy="5604308"/>
+          </a:xfrm>
+        </p:spPr>
+        <p:txBody>
+          <a:bodyPr>
+            <a:normAutofit/>
+          </a:bodyPr>
+          <a:lstStyle/>
+          <a:p>
+            <a:pPr marL="0" indent="0">
+              <a:buNone/>
+            </a:pPr>
+            <a:r>
+              <a:rPr lang="fr-FR" sz="2400" b="0" dirty="0">
+                <a:solidFill>
+                  <a:srgbClr val="D73A49"/>
+                </a:solidFill>
+                <a:effectLst/>
+                <a:latin typeface="Consolas" panose="020B0609020204030204" pitchFamily="49" charset="0"/>
+              </a:rPr>
+              <a:t>class</a:t>
+            </a:r>
+            <a:r>
+              <a:rPr lang="fr-FR" sz="2400" b="0" dirty="0">
+                <a:solidFill>
+                  <a:srgbClr val="24292E"/>
+                </a:solidFill>
+                <a:effectLst/>
+                <a:latin typeface="Consolas" panose="020B0609020204030204" pitchFamily="49" charset="0"/>
+              </a:rPr>
+              <a:t> </a:t>
+            </a:r>
+            <a:r>
+              <a:rPr lang="fr-FR" sz="2400" b="0" dirty="0" err="1">
+                <a:solidFill>
+                  <a:srgbClr val="6F42C1"/>
+                </a:solidFill>
+                <a:effectLst/>
+                <a:latin typeface="Consolas" panose="020B0609020204030204" pitchFamily="49" charset="0"/>
+              </a:rPr>
+              <a:t>ObjectCounter</a:t>
+            </a:r>
+            <a:endParaRPr lang="fr-FR" sz="2400" b="0" dirty="0">
+              <a:solidFill>
+                <a:srgbClr val="24292E"/>
+              </a:solidFill>
+              <a:effectLst/>
+              <a:latin typeface="Consolas" panose="020B0609020204030204" pitchFamily="49" charset="0"/>
+            </a:endParaRPr>
+          </a:p>
+          <a:p>
+            <a:pPr marL="0" indent="0">
+              <a:buNone/>
+            </a:pPr>
+            <a:r>
+              <a:rPr lang="fr-FR" sz="2400" b="0" dirty="0">
+                <a:solidFill>
+                  <a:srgbClr val="24292E"/>
+                </a:solidFill>
+                <a:effectLst/>
+                <a:latin typeface="Consolas" panose="020B0609020204030204" pitchFamily="49" charset="0"/>
+              </a:rPr>
+              <a:t>{</a:t>
+            </a:r>
+          </a:p>
+          <a:p>
+            <a:pPr marL="0" indent="0">
+              <a:buNone/>
+            </a:pPr>
+            <a:r>
+              <a:rPr lang="fr-FR" sz="2400" b="0" dirty="0">
+                <a:solidFill>
+                  <a:srgbClr val="24292E"/>
+                </a:solidFill>
+                <a:effectLst/>
+                <a:latin typeface="Consolas" panose="020B0609020204030204" pitchFamily="49" charset="0"/>
+              </a:rPr>
+              <a:t>   </a:t>
+            </a:r>
+            <a:r>
+              <a:rPr lang="fr-FR" sz="2400" b="0" dirty="0" err="1">
+                <a:solidFill>
+                  <a:srgbClr val="D73A49"/>
+                </a:solidFill>
+                <a:effectLst/>
+                <a:latin typeface="Consolas" panose="020B0609020204030204" pitchFamily="49" charset="0"/>
+              </a:rPr>
+              <a:t>private</a:t>
+            </a:r>
+            <a:r>
+              <a:rPr lang="fr-FR" sz="2400" b="0" dirty="0">
+                <a:solidFill>
+                  <a:srgbClr val="D73A49"/>
+                </a:solidFill>
+                <a:effectLst/>
+                <a:latin typeface="Consolas" panose="020B0609020204030204" pitchFamily="49" charset="0"/>
+              </a:rPr>
+              <a:t>:</a:t>
+            </a:r>
+            <a:endParaRPr lang="fr-FR" sz="2400" b="0" dirty="0">
+              <a:solidFill>
+                <a:srgbClr val="24292E"/>
+              </a:solidFill>
+              <a:effectLst/>
+              <a:latin typeface="Consolas" panose="020B0609020204030204" pitchFamily="49" charset="0"/>
+            </a:endParaRPr>
+          </a:p>
+          <a:p>
+            <a:pPr marL="0" indent="0">
+              <a:buNone/>
+            </a:pPr>
+            <a:r>
+              <a:rPr lang="fr-FR" sz="2400" b="0" dirty="0">
+                <a:solidFill>
+                  <a:srgbClr val="24292E"/>
+                </a:solidFill>
+                <a:effectLst/>
+                <a:latin typeface="Consolas" panose="020B0609020204030204" pitchFamily="49" charset="0"/>
+              </a:rPr>
+              <a:t>      </a:t>
+            </a:r>
+            <a:r>
+              <a:rPr lang="fr-FR" sz="2400" b="0" dirty="0" err="1">
+                <a:solidFill>
+                  <a:srgbClr val="D73A49"/>
+                </a:solidFill>
+                <a:effectLst/>
+                <a:latin typeface="Consolas" panose="020B0609020204030204" pitchFamily="49" charset="0"/>
+              </a:rPr>
+              <a:t>static</a:t>
+            </a:r>
+            <a:r>
+              <a:rPr lang="fr-FR" sz="2400" b="0" dirty="0">
+                <a:solidFill>
+                  <a:srgbClr val="24292E"/>
+                </a:solidFill>
+                <a:effectLst/>
+                <a:latin typeface="Consolas" panose="020B0609020204030204" pitchFamily="49" charset="0"/>
+              </a:rPr>
+              <a:t> </a:t>
+            </a:r>
+            <a:r>
+              <a:rPr lang="fr-FR" sz="2400" b="0" dirty="0" err="1">
+                <a:solidFill>
+                  <a:srgbClr val="D73A49"/>
+                </a:solidFill>
+                <a:effectLst/>
+                <a:latin typeface="Consolas" panose="020B0609020204030204" pitchFamily="49" charset="0"/>
+              </a:rPr>
+              <a:t>int</a:t>
+            </a:r>
+            <a:r>
+              <a:rPr lang="fr-FR" sz="2400" b="0" dirty="0">
+                <a:solidFill>
+                  <a:srgbClr val="24292E"/>
+                </a:solidFill>
+                <a:effectLst/>
+                <a:latin typeface="Consolas" panose="020B0609020204030204" pitchFamily="49" charset="0"/>
+              </a:rPr>
+              <a:t> count;</a:t>
+            </a:r>
+            <a:r>
+              <a:rPr lang="fr-FR" sz="2400" b="0" dirty="0">
+                <a:solidFill>
+                  <a:srgbClr val="6A737D"/>
+                </a:solidFill>
+                <a:effectLst/>
+                <a:latin typeface="Consolas" panose="020B0609020204030204" pitchFamily="49" charset="0"/>
+              </a:rPr>
+              <a:t>  // Compteur du nombre d'objets créés</a:t>
+            </a:r>
+            <a:endParaRPr lang="fr-FR" sz="2400" b="0" dirty="0">
+              <a:solidFill>
+                <a:srgbClr val="24292E"/>
+              </a:solidFill>
+              <a:effectLst/>
+              <a:latin typeface="Consolas" panose="020B0609020204030204" pitchFamily="49" charset="0"/>
+            </a:endParaRPr>
+          </a:p>
+          <a:p>
+            <a:pPr marL="0" indent="0">
+              <a:buNone/>
+            </a:pPr>
+            <a:r>
+              <a:rPr lang="fr-FR" sz="2400" b="0" dirty="0">
+                <a:solidFill>
+                  <a:srgbClr val="24292E"/>
+                </a:solidFill>
+                <a:effectLst/>
+                <a:latin typeface="Consolas" panose="020B0609020204030204" pitchFamily="49" charset="0"/>
+              </a:rPr>
+              <a:t>   </a:t>
+            </a:r>
+            <a:r>
+              <a:rPr lang="fr-FR" sz="2400" b="0" dirty="0">
+                <a:solidFill>
+                  <a:srgbClr val="D73A49"/>
+                </a:solidFill>
+                <a:effectLst/>
+                <a:latin typeface="Consolas" panose="020B0609020204030204" pitchFamily="49" charset="0"/>
+              </a:rPr>
+              <a:t>public:</a:t>
+            </a:r>
+            <a:endParaRPr lang="fr-FR" sz="2400" b="0" dirty="0">
+              <a:solidFill>
+                <a:srgbClr val="24292E"/>
+              </a:solidFill>
+              <a:effectLst/>
+              <a:latin typeface="Consolas" panose="020B0609020204030204" pitchFamily="49" charset="0"/>
+            </a:endParaRPr>
+          </a:p>
+          <a:p>
+            <a:pPr marL="0" indent="0">
+              <a:buNone/>
+            </a:pPr>
+            <a:r>
+              <a:rPr lang="fr-FR" sz="2400" b="0" dirty="0">
+                <a:solidFill>
+                  <a:srgbClr val="24292E"/>
+                </a:solidFill>
+                <a:effectLst/>
+                <a:latin typeface="Consolas" panose="020B0609020204030204" pitchFamily="49" charset="0"/>
+              </a:rPr>
+              <a:t>      </a:t>
+            </a:r>
+            <a:r>
+              <a:rPr lang="fr-FR" sz="2400" b="0" dirty="0" err="1">
+                <a:solidFill>
+                  <a:srgbClr val="6F42C1"/>
+                </a:solidFill>
+                <a:effectLst/>
+                <a:latin typeface="Consolas" panose="020B0609020204030204" pitchFamily="49" charset="0"/>
+              </a:rPr>
+              <a:t>ObjectCounter</a:t>
+            </a:r>
+            <a:r>
+              <a:rPr lang="fr-FR" sz="2400" b="0" dirty="0">
+                <a:solidFill>
+                  <a:srgbClr val="24292E"/>
+                </a:solidFill>
+                <a:effectLst/>
+                <a:latin typeface="Consolas" panose="020B0609020204030204" pitchFamily="49" charset="0"/>
+              </a:rPr>
+              <a:t> ();</a:t>
+            </a:r>
+            <a:r>
+              <a:rPr lang="fr-FR" sz="2400" b="0" dirty="0">
+                <a:solidFill>
+                  <a:srgbClr val="6A737D"/>
+                </a:solidFill>
+                <a:effectLst/>
+                <a:latin typeface="Consolas" panose="020B0609020204030204" pitchFamily="49" charset="0"/>
+              </a:rPr>
+              <a:t>  // Constructeur</a:t>
+            </a:r>
+            <a:endParaRPr lang="fr-FR" sz="2400" b="0" dirty="0">
+              <a:solidFill>
+                <a:srgbClr val="24292E"/>
+              </a:solidFill>
+              <a:effectLst/>
+              <a:latin typeface="Consolas" panose="020B0609020204030204" pitchFamily="49" charset="0"/>
+            </a:endParaRPr>
+          </a:p>
+          <a:p>
+            <a:pPr marL="0" indent="0">
+              <a:buNone/>
+            </a:pPr>
+            <a:r>
+              <a:rPr lang="fr-FR" sz="2400" b="0" dirty="0">
+                <a:solidFill>
+                  <a:srgbClr val="24292E"/>
+                </a:solidFill>
+                <a:effectLst/>
+                <a:latin typeface="Consolas" panose="020B0609020204030204" pitchFamily="49" charset="0"/>
+              </a:rPr>
+              <a:t>      </a:t>
+            </a:r>
+            <a:r>
+              <a:rPr lang="fr-FR" sz="2400" b="1" dirty="0">
+                <a:solidFill>
+                  <a:srgbClr val="6F42C1"/>
+                </a:solidFill>
+                <a:effectLst/>
+                <a:latin typeface="Consolas" panose="020B0609020204030204" pitchFamily="49" charset="0"/>
+              </a:rPr>
+              <a:t>~</a:t>
+            </a:r>
+            <a:r>
+              <a:rPr lang="fr-FR" sz="2400" b="1" dirty="0" err="1">
+                <a:solidFill>
+                  <a:srgbClr val="6F42C1"/>
+                </a:solidFill>
+                <a:effectLst/>
+                <a:latin typeface="Consolas" panose="020B0609020204030204" pitchFamily="49" charset="0"/>
+              </a:rPr>
+              <a:t>ObjectCounter</a:t>
+            </a:r>
+            <a:r>
+              <a:rPr lang="fr-FR" sz="2400" b="1" dirty="0">
+                <a:solidFill>
+                  <a:srgbClr val="24292E"/>
+                </a:solidFill>
+                <a:effectLst/>
+                <a:latin typeface="Consolas" panose="020B0609020204030204" pitchFamily="49" charset="0"/>
+              </a:rPr>
+              <a:t> ();</a:t>
+            </a:r>
+            <a:r>
+              <a:rPr lang="fr-FR" sz="2400" b="1" dirty="0">
+                <a:solidFill>
+                  <a:srgbClr val="6A737D"/>
+                </a:solidFill>
+                <a:effectLst/>
+                <a:latin typeface="Consolas" panose="020B0609020204030204" pitchFamily="49" charset="0"/>
+              </a:rPr>
+              <a:t> </a:t>
+            </a:r>
+            <a:r>
+              <a:rPr lang="fr-FR" sz="2400" b="0" dirty="0">
+                <a:solidFill>
+                  <a:srgbClr val="6A737D"/>
+                </a:solidFill>
+                <a:effectLst/>
+                <a:latin typeface="Consolas" panose="020B0609020204030204" pitchFamily="49" charset="0"/>
+              </a:rPr>
+              <a:t>// Destructeur</a:t>
+            </a:r>
+            <a:endParaRPr lang="fr-FR" sz="2400" b="0" dirty="0">
+              <a:solidFill>
+                <a:srgbClr val="24292E"/>
+              </a:solidFill>
+              <a:effectLst/>
+              <a:latin typeface="Consolas" panose="020B0609020204030204" pitchFamily="49" charset="0"/>
+            </a:endParaRPr>
+          </a:p>
+          <a:p>
+            <a:pPr marL="0" indent="0">
+              <a:buNone/>
+            </a:pPr>
+            <a:r>
+              <a:rPr lang="fr-FR" sz="2400" b="0" dirty="0">
+                <a:solidFill>
+                  <a:srgbClr val="24292E"/>
+                </a:solidFill>
+                <a:effectLst/>
+                <a:latin typeface="Consolas" panose="020B0609020204030204" pitchFamily="49" charset="0"/>
+              </a:rPr>
+              <a:t>};</a:t>
+            </a:r>
+          </a:p>
+        </p:txBody>
+      </p:sp>
+    </p:spTree>
+    <p:extLst>
+      <p:ext uri="{BB962C8B-B14F-4D97-AF65-F5344CB8AC3E}">
+        <p14:creationId xmlns:p14="http://schemas.microsoft.com/office/powerpoint/2010/main" val="3548120589"/>
+      </p:ext>
+    </p:extLst>
+  </p:cSld>
+  <p:clrMapOvr>
+    <a:masterClrMapping/>
+  </p:clrMapOvr>
+</p:sld>
+</file>
+
 <file path=ppt/slides/slide2.xml><?xml version="1.0" encoding="utf-8"?>
 <p:sld xmlns:a="http://schemas.openxmlformats.org/drawingml/2006/main" xmlns:r="http://schemas.openxmlformats.org/officeDocument/2006/relationships" xmlns:p="http://schemas.openxmlformats.org/presentationml/2006/main">
   <p:cSld>
@@ -11611,6 +13072,1593 @@
     <p:extLst>
       <p:ext uri="{BB962C8B-B14F-4D97-AF65-F5344CB8AC3E}">
         <p14:creationId xmlns:p14="http://schemas.microsoft.com/office/powerpoint/2010/main" val="1637126758"/>
+      </p:ext>
+    </p:extLst>
+  </p:cSld>
+  <p:clrMapOvr>
+    <a:masterClrMapping/>
+  </p:clrMapOvr>
+</p:sld>
+</file>
+
+<file path=ppt/slides/slide20.xml><?xml version="1.0" encoding="utf-8"?>
+<p:sld xmlns:a="http://schemas.openxmlformats.org/drawingml/2006/main" xmlns:r="http://schemas.openxmlformats.org/officeDocument/2006/relationships" xmlns:p="http://schemas.openxmlformats.org/presentationml/2006/main">
+  <p:cSld>
+    <p:spTree>
+      <p:nvGrpSpPr>
+        <p:cNvPr id="1" name=""/>
+        <p:cNvGrpSpPr/>
+        <p:nvPr/>
+      </p:nvGrpSpPr>
+      <p:grpSpPr>
+        <a:xfrm>
+          <a:off x="0" y="0"/>
+          <a:ext cx="0" cy="0"/>
+          <a:chOff x="0" y="0"/>
+          <a:chExt cx="0" cy="0"/>
+        </a:xfrm>
+      </p:grpSpPr>
+      <p:sp>
+        <p:nvSpPr>
+          <p:cNvPr id="3" name="Espace réservé du contenu 2">
+            <a:extLst>
+              <a:ext uri="{FF2B5EF4-FFF2-40B4-BE49-F238E27FC236}">
+                <a16:creationId xmlns:a16="http://schemas.microsoft.com/office/drawing/2014/main" id="{A41F34DA-DB20-47C7-B42D-04BDED91DC6F}"/>
+              </a:ext>
+            </a:extLst>
+          </p:cNvPr>
+          <p:cNvSpPr>
+            <a:spLocks noGrp="1"/>
+          </p:cNvSpPr>
+          <p:nvPr>
+            <p:ph idx="1"/>
+          </p:nvPr>
+        </p:nvSpPr>
+        <p:spPr>
+          <a:xfrm>
+            <a:off x="838200" y="572655"/>
+            <a:ext cx="10515600" cy="5604308"/>
+          </a:xfrm>
+        </p:spPr>
+        <p:txBody>
+          <a:bodyPr>
+            <a:normAutofit/>
+          </a:bodyPr>
+          <a:lstStyle/>
+          <a:p>
+            <a:pPr marL="0" indent="0">
+              <a:buNone/>
+            </a:pPr>
+            <a:r>
+              <a:rPr lang="fr-FR" sz="2400" b="0" dirty="0">
+                <a:solidFill>
+                  <a:srgbClr val="6A737D"/>
+                </a:solidFill>
+                <a:effectLst/>
+                <a:latin typeface="Consolas" panose="020B0609020204030204" pitchFamily="49" charset="0"/>
+              </a:rPr>
+              <a:t>// Initialisation de la variable statique </a:t>
+            </a:r>
+          </a:p>
+          <a:p>
+            <a:pPr marL="0" indent="0">
+              <a:buNone/>
+            </a:pPr>
+            <a:r>
+              <a:rPr lang="fr-FR" sz="2400" b="0" dirty="0" err="1">
+                <a:solidFill>
+                  <a:srgbClr val="D73A49"/>
+                </a:solidFill>
+                <a:effectLst/>
+                <a:latin typeface="Consolas" panose="020B0609020204030204" pitchFamily="49" charset="0"/>
+              </a:rPr>
+              <a:t>int</a:t>
+            </a:r>
+            <a:r>
+              <a:rPr lang="fr-FR" sz="2400" b="0" dirty="0">
+                <a:solidFill>
+                  <a:srgbClr val="24292E"/>
+                </a:solidFill>
+                <a:effectLst/>
+                <a:latin typeface="Consolas" panose="020B0609020204030204" pitchFamily="49" charset="0"/>
+              </a:rPr>
+              <a:t> </a:t>
+            </a:r>
+            <a:r>
+              <a:rPr lang="fr-FR" sz="2400" b="0" dirty="0" err="1">
+                <a:solidFill>
+                  <a:srgbClr val="6F42C1"/>
+                </a:solidFill>
+                <a:effectLst/>
+                <a:latin typeface="Consolas" panose="020B0609020204030204" pitchFamily="49" charset="0"/>
+              </a:rPr>
+              <a:t>ObjectCounter</a:t>
+            </a:r>
+            <a:r>
+              <a:rPr lang="fr-FR" sz="2400" b="0" dirty="0">
+                <a:solidFill>
+                  <a:srgbClr val="24292E"/>
+                </a:solidFill>
+                <a:effectLst/>
+                <a:latin typeface="Consolas" panose="020B0609020204030204" pitchFamily="49" charset="0"/>
+              </a:rPr>
+              <a:t>::count </a:t>
+            </a:r>
+            <a:r>
+              <a:rPr lang="fr-FR" sz="2400" b="0" dirty="0">
+                <a:solidFill>
+                  <a:srgbClr val="D73A49"/>
+                </a:solidFill>
+                <a:effectLst/>
+                <a:latin typeface="Consolas" panose="020B0609020204030204" pitchFamily="49" charset="0"/>
+              </a:rPr>
+              <a:t>=</a:t>
+            </a:r>
+            <a:r>
+              <a:rPr lang="fr-FR" sz="2400" b="0" dirty="0">
+                <a:solidFill>
+                  <a:srgbClr val="24292E"/>
+                </a:solidFill>
+                <a:effectLst/>
+                <a:latin typeface="Consolas" panose="020B0609020204030204" pitchFamily="49" charset="0"/>
+              </a:rPr>
+              <a:t> </a:t>
+            </a:r>
+            <a:r>
+              <a:rPr lang="fr-FR" sz="2400" b="0" dirty="0">
+                <a:solidFill>
+                  <a:srgbClr val="005CC5"/>
+                </a:solidFill>
+                <a:effectLst/>
+                <a:latin typeface="Consolas" panose="020B0609020204030204" pitchFamily="49" charset="0"/>
+              </a:rPr>
+              <a:t>0</a:t>
+            </a:r>
+            <a:r>
+              <a:rPr lang="fr-FR" sz="2400" b="0" dirty="0">
+                <a:solidFill>
+                  <a:srgbClr val="24292E"/>
+                </a:solidFill>
+                <a:effectLst/>
+                <a:latin typeface="Consolas" panose="020B0609020204030204" pitchFamily="49" charset="0"/>
+              </a:rPr>
+              <a:t>;</a:t>
+            </a:r>
+            <a:r>
+              <a:rPr lang="fr-FR" sz="2400" b="0" dirty="0">
+                <a:solidFill>
+                  <a:srgbClr val="6A737D"/>
+                </a:solidFill>
+                <a:effectLst/>
+                <a:latin typeface="Consolas" panose="020B0609020204030204" pitchFamily="49" charset="0"/>
+              </a:rPr>
+              <a:t>   </a:t>
+            </a:r>
+            <a:endParaRPr lang="fr-FR" sz="2400" b="0" dirty="0">
+              <a:solidFill>
+                <a:srgbClr val="24292E"/>
+              </a:solidFill>
+              <a:effectLst/>
+              <a:latin typeface="Consolas" panose="020B0609020204030204" pitchFamily="49" charset="0"/>
+            </a:endParaRPr>
+          </a:p>
+          <a:p>
+            <a:pPr marL="0" indent="0">
+              <a:buNone/>
+            </a:pPr>
+            <a:br>
+              <a:rPr lang="fr-FR" sz="2400" b="0" dirty="0">
+                <a:solidFill>
+                  <a:srgbClr val="24292E"/>
+                </a:solidFill>
+                <a:effectLst/>
+                <a:latin typeface="Consolas" panose="020B0609020204030204" pitchFamily="49" charset="0"/>
+              </a:rPr>
+            </a:br>
+            <a:r>
+              <a:rPr lang="fr-FR" sz="2400" b="0" dirty="0">
+                <a:solidFill>
+                  <a:srgbClr val="6A737D"/>
+                </a:solidFill>
+                <a:effectLst/>
+                <a:latin typeface="Consolas" panose="020B0609020204030204" pitchFamily="49" charset="0"/>
+              </a:rPr>
+              <a:t>// Définition du constructeur</a:t>
+            </a:r>
+            <a:endParaRPr lang="fr-FR" sz="2400" b="0" dirty="0">
+              <a:solidFill>
+                <a:srgbClr val="24292E"/>
+              </a:solidFill>
+              <a:effectLst/>
+              <a:latin typeface="Consolas" panose="020B0609020204030204" pitchFamily="49" charset="0"/>
+            </a:endParaRPr>
+          </a:p>
+          <a:p>
+            <a:pPr marL="0" indent="0">
+              <a:buNone/>
+            </a:pPr>
+            <a:r>
+              <a:rPr lang="fr-FR" sz="2400" b="0" dirty="0" err="1">
+                <a:solidFill>
+                  <a:srgbClr val="6F42C1"/>
+                </a:solidFill>
+                <a:effectLst/>
+                <a:latin typeface="Consolas" panose="020B0609020204030204" pitchFamily="49" charset="0"/>
+              </a:rPr>
+              <a:t>ObjectCounter</a:t>
+            </a:r>
+            <a:r>
+              <a:rPr lang="fr-FR" sz="2400" b="0" dirty="0">
+                <a:solidFill>
+                  <a:srgbClr val="24292E"/>
+                </a:solidFill>
+                <a:effectLst/>
+                <a:latin typeface="Consolas" panose="020B0609020204030204" pitchFamily="49" charset="0"/>
+              </a:rPr>
+              <a:t>::</a:t>
+            </a:r>
+            <a:r>
+              <a:rPr lang="fr-FR" sz="2400" b="0" dirty="0" err="1">
+                <a:solidFill>
+                  <a:srgbClr val="6F42C1"/>
+                </a:solidFill>
+                <a:effectLst/>
+                <a:latin typeface="Consolas" panose="020B0609020204030204" pitchFamily="49" charset="0"/>
+              </a:rPr>
+              <a:t>ObjectCounter</a:t>
+            </a:r>
+            <a:r>
+              <a:rPr lang="fr-FR" sz="2400" b="0" dirty="0">
+                <a:solidFill>
+                  <a:srgbClr val="24292E"/>
+                </a:solidFill>
+                <a:effectLst/>
+                <a:latin typeface="Consolas" panose="020B0609020204030204" pitchFamily="49" charset="0"/>
+              </a:rPr>
+              <a:t>() {    </a:t>
+            </a:r>
+          </a:p>
+          <a:p>
+            <a:pPr marL="0" indent="0">
+              <a:buNone/>
+            </a:pPr>
+            <a:r>
+              <a:rPr lang="fr-FR" sz="2400" b="0" dirty="0">
+                <a:solidFill>
+                  <a:srgbClr val="24292E"/>
+                </a:solidFill>
+                <a:effectLst/>
+                <a:latin typeface="Consolas" panose="020B0609020204030204" pitchFamily="49" charset="0"/>
+              </a:rPr>
+              <a:t>    </a:t>
+            </a:r>
+            <a:r>
+              <a:rPr lang="fr-FR" sz="1800" b="0" dirty="0">
+                <a:solidFill>
+                  <a:srgbClr val="24292E"/>
+                </a:solidFill>
+                <a:effectLst/>
+                <a:latin typeface="Consolas" panose="020B0609020204030204" pitchFamily="49" charset="0"/>
+              </a:rPr>
+              <a:t>cout </a:t>
+            </a:r>
+            <a:r>
+              <a:rPr lang="fr-FR" sz="1800" b="0" dirty="0">
+                <a:solidFill>
+                  <a:srgbClr val="6F42C1"/>
+                </a:solidFill>
+                <a:effectLst/>
+                <a:latin typeface="Consolas" panose="020B0609020204030204" pitchFamily="49" charset="0"/>
+              </a:rPr>
+              <a:t>&lt;&lt;</a:t>
+            </a:r>
+            <a:r>
+              <a:rPr lang="fr-FR" sz="1800" b="0" dirty="0">
+                <a:solidFill>
+                  <a:srgbClr val="24292E"/>
+                </a:solidFill>
+                <a:effectLst/>
+                <a:latin typeface="Consolas" panose="020B0609020204030204" pitchFamily="49" charset="0"/>
+              </a:rPr>
+              <a:t> </a:t>
+            </a:r>
+            <a:r>
+              <a:rPr lang="fr-FR" sz="1800" b="0" dirty="0">
+                <a:solidFill>
+                  <a:srgbClr val="032F62"/>
+                </a:solidFill>
+                <a:effectLst/>
+                <a:latin typeface="Consolas" panose="020B0609020204030204" pitchFamily="49" charset="0"/>
+              </a:rPr>
+              <a:t>"++ construction : il y a maintenant "</a:t>
+            </a:r>
+            <a:r>
+              <a:rPr lang="fr-FR" sz="1800" b="0" dirty="0">
+                <a:solidFill>
+                  <a:srgbClr val="24292E"/>
+                </a:solidFill>
+                <a:effectLst/>
+                <a:latin typeface="Consolas" panose="020B0609020204030204" pitchFamily="49" charset="0"/>
+              </a:rPr>
+              <a:t> </a:t>
+            </a:r>
+            <a:r>
+              <a:rPr lang="fr-FR" sz="1800" b="0" dirty="0">
+                <a:solidFill>
+                  <a:srgbClr val="6F42C1"/>
+                </a:solidFill>
+                <a:effectLst/>
+                <a:latin typeface="Consolas" panose="020B0609020204030204" pitchFamily="49" charset="0"/>
+              </a:rPr>
+              <a:t>&lt;&lt;</a:t>
+            </a:r>
+            <a:r>
+              <a:rPr lang="fr-FR" sz="1800" b="0" dirty="0">
+                <a:solidFill>
+                  <a:srgbClr val="24292E"/>
+                </a:solidFill>
+                <a:effectLst/>
+                <a:latin typeface="Consolas" panose="020B0609020204030204" pitchFamily="49" charset="0"/>
+              </a:rPr>
+              <a:t> </a:t>
+            </a:r>
+            <a:r>
+              <a:rPr lang="fr-FR" sz="1800" b="0" dirty="0">
+                <a:solidFill>
+                  <a:srgbClr val="D73A49"/>
+                </a:solidFill>
+                <a:effectLst/>
+                <a:latin typeface="Consolas" panose="020B0609020204030204" pitchFamily="49" charset="0"/>
+              </a:rPr>
+              <a:t>++</a:t>
+            </a:r>
+            <a:r>
+              <a:rPr lang="fr-FR" sz="1800" b="0" dirty="0">
+                <a:solidFill>
+                  <a:srgbClr val="24292E"/>
+                </a:solidFill>
+                <a:effectLst/>
+                <a:latin typeface="Consolas" panose="020B0609020204030204" pitchFamily="49" charset="0"/>
+              </a:rPr>
+              <a:t>count </a:t>
+            </a:r>
+            <a:r>
+              <a:rPr lang="fr-FR" sz="1800" b="0" dirty="0">
+                <a:solidFill>
+                  <a:srgbClr val="6F42C1"/>
+                </a:solidFill>
+                <a:effectLst/>
+                <a:latin typeface="Consolas" panose="020B0609020204030204" pitchFamily="49" charset="0"/>
+              </a:rPr>
+              <a:t>&lt;&lt;</a:t>
+            </a:r>
+            <a:r>
+              <a:rPr lang="fr-FR" sz="1800" b="0" dirty="0">
+                <a:solidFill>
+                  <a:srgbClr val="24292E"/>
+                </a:solidFill>
+                <a:effectLst/>
+                <a:latin typeface="Consolas" panose="020B0609020204030204" pitchFamily="49" charset="0"/>
+              </a:rPr>
+              <a:t> </a:t>
+            </a:r>
+            <a:r>
+              <a:rPr lang="fr-FR" sz="1800" b="0" dirty="0">
+                <a:solidFill>
+                  <a:srgbClr val="032F62"/>
+                </a:solidFill>
+                <a:effectLst/>
+                <a:latin typeface="Consolas" panose="020B0609020204030204" pitchFamily="49" charset="0"/>
+              </a:rPr>
+              <a:t>" objet(s)</a:t>
+            </a:r>
+            <a:r>
+              <a:rPr lang="fr-FR" sz="1800" b="0" dirty="0">
+                <a:solidFill>
+                  <a:srgbClr val="005CC5"/>
+                </a:solidFill>
+                <a:effectLst/>
+                <a:latin typeface="Consolas" panose="020B0609020204030204" pitchFamily="49" charset="0"/>
+              </a:rPr>
+              <a:t>\n</a:t>
+            </a:r>
+            <a:r>
+              <a:rPr lang="fr-FR" sz="1800" b="0" dirty="0">
+                <a:solidFill>
+                  <a:srgbClr val="032F62"/>
+                </a:solidFill>
+                <a:effectLst/>
+                <a:latin typeface="Consolas" panose="020B0609020204030204" pitchFamily="49" charset="0"/>
+              </a:rPr>
+              <a:t>"</a:t>
+            </a:r>
+            <a:r>
+              <a:rPr lang="fr-FR" sz="1800" b="0" dirty="0">
+                <a:solidFill>
+                  <a:srgbClr val="24292E"/>
+                </a:solidFill>
+                <a:effectLst/>
+                <a:latin typeface="Consolas" panose="020B0609020204030204" pitchFamily="49" charset="0"/>
+              </a:rPr>
+              <a:t>;</a:t>
+            </a:r>
+          </a:p>
+          <a:p>
+            <a:pPr marL="0" indent="0">
+              <a:buNone/>
+            </a:pPr>
+            <a:r>
+              <a:rPr lang="fr-FR" sz="2400" b="0" dirty="0">
+                <a:solidFill>
+                  <a:srgbClr val="24292E"/>
+                </a:solidFill>
+                <a:effectLst/>
+                <a:latin typeface="Consolas" panose="020B0609020204030204" pitchFamily="49" charset="0"/>
+              </a:rPr>
+              <a:t>}</a:t>
+            </a:r>
+          </a:p>
+          <a:p>
+            <a:pPr marL="0" indent="0">
+              <a:buNone/>
+            </a:pPr>
+            <a:br>
+              <a:rPr lang="fr-FR" sz="2400" b="0" dirty="0">
+                <a:solidFill>
+                  <a:srgbClr val="24292E"/>
+                </a:solidFill>
+                <a:effectLst/>
+                <a:latin typeface="Consolas" panose="020B0609020204030204" pitchFamily="49" charset="0"/>
+              </a:rPr>
+            </a:br>
+            <a:r>
+              <a:rPr lang="fr-FR" sz="2400" b="0" dirty="0">
+                <a:solidFill>
+                  <a:srgbClr val="6A737D"/>
+                </a:solidFill>
+                <a:effectLst/>
+                <a:latin typeface="Consolas" panose="020B0609020204030204" pitchFamily="49" charset="0"/>
+              </a:rPr>
+              <a:t>// Définition du destructeur</a:t>
+            </a:r>
+            <a:endParaRPr lang="fr-FR" sz="2400" b="0" dirty="0">
+              <a:solidFill>
+                <a:srgbClr val="24292E"/>
+              </a:solidFill>
+              <a:effectLst/>
+              <a:latin typeface="Consolas" panose="020B0609020204030204" pitchFamily="49" charset="0"/>
+            </a:endParaRPr>
+          </a:p>
+          <a:p>
+            <a:pPr marL="0" indent="0">
+              <a:buNone/>
+            </a:pPr>
+            <a:r>
+              <a:rPr lang="fr-FR" sz="2400" b="0" dirty="0" err="1">
+                <a:solidFill>
+                  <a:srgbClr val="6F42C1"/>
+                </a:solidFill>
+                <a:effectLst/>
+                <a:latin typeface="Consolas" panose="020B0609020204030204" pitchFamily="49" charset="0"/>
+              </a:rPr>
+              <a:t>ObjectCounter</a:t>
+            </a:r>
+            <a:r>
+              <a:rPr lang="fr-FR" sz="2400" b="0" dirty="0">
+                <a:solidFill>
+                  <a:srgbClr val="24292E"/>
+                </a:solidFill>
+                <a:effectLst/>
+                <a:latin typeface="Consolas" panose="020B0609020204030204" pitchFamily="49" charset="0"/>
+              </a:rPr>
+              <a:t>::</a:t>
+            </a:r>
+            <a:r>
+              <a:rPr lang="fr-FR" sz="2400" b="0" dirty="0">
+                <a:solidFill>
+                  <a:srgbClr val="6F42C1"/>
+                </a:solidFill>
+                <a:effectLst/>
+                <a:latin typeface="Consolas" panose="020B0609020204030204" pitchFamily="49" charset="0"/>
+              </a:rPr>
+              <a:t>~</a:t>
+            </a:r>
+            <a:r>
+              <a:rPr lang="fr-FR" sz="2400" b="0" dirty="0" err="1">
+                <a:solidFill>
+                  <a:srgbClr val="6F42C1"/>
+                </a:solidFill>
+                <a:effectLst/>
+                <a:latin typeface="Consolas" panose="020B0609020204030204" pitchFamily="49" charset="0"/>
+              </a:rPr>
+              <a:t>ObjectCounter</a:t>
+            </a:r>
+            <a:r>
+              <a:rPr lang="fr-FR" sz="2400" b="0" dirty="0">
+                <a:solidFill>
+                  <a:srgbClr val="24292E"/>
+                </a:solidFill>
+                <a:effectLst/>
+                <a:latin typeface="Consolas" panose="020B0609020204030204" pitchFamily="49" charset="0"/>
+              </a:rPr>
+              <a:t>() {  </a:t>
+            </a:r>
+          </a:p>
+          <a:p>
+            <a:pPr marL="0" indent="0">
+              <a:buNone/>
+            </a:pPr>
+            <a:r>
+              <a:rPr lang="fr-FR" sz="2400" b="0" dirty="0">
+                <a:solidFill>
+                  <a:srgbClr val="24292E"/>
+                </a:solidFill>
+                <a:effectLst/>
+                <a:latin typeface="Consolas" panose="020B0609020204030204" pitchFamily="49" charset="0"/>
+              </a:rPr>
+              <a:t>    </a:t>
+            </a:r>
+            <a:r>
+              <a:rPr lang="fr-FR" sz="1800" b="0" dirty="0">
+                <a:solidFill>
+                  <a:srgbClr val="24292E"/>
+                </a:solidFill>
+                <a:effectLst/>
+                <a:latin typeface="Consolas" panose="020B0609020204030204" pitchFamily="49" charset="0"/>
+              </a:rPr>
+              <a:t>cout </a:t>
+            </a:r>
+            <a:r>
+              <a:rPr lang="fr-FR" sz="1800" b="0" dirty="0">
+                <a:solidFill>
+                  <a:srgbClr val="6F42C1"/>
+                </a:solidFill>
+                <a:effectLst/>
+                <a:latin typeface="Consolas" panose="020B0609020204030204" pitchFamily="49" charset="0"/>
+              </a:rPr>
+              <a:t>&lt;&lt;</a:t>
+            </a:r>
+            <a:r>
+              <a:rPr lang="fr-FR" sz="1800" b="0" dirty="0">
+                <a:solidFill>
+                  <a:srgbClr val="24292E"/>
+                </a:solidFill>
+                <a:effectLst/>
+                <a:latin typeface="Consolas" panose="020B0609020204030204" pitchFamily="49" charset="0"/>
+              </a:rPr>
+              <a:t> </a:t>
+            </a:r>
+            <a:r>
+              <a:rPr lang="fr-FR" sz="1800" b="0" dirty="0">
+                <a:solidFill>
+                  <a:srgbClr val="032F62"/>
+                </a:solidFill>
+                <a:effectLst/>
+                <a:latin typeface="Consolas" panose="020B0609020204030204" pitchFamily="49" charset="0"/>
+              </a:rPr>
+              <a:t>"-- destruction : il y a maintenant "</a:t>
+            </a:r>
+            <a:r>
+              <a:rPr lang="fr-FR" sz="1800" b="0" dirty="0">
+                <a:solidFill>
+                  <a:srgbClr val="24292E"/>
+                </a:solidFill>
+                <a:effectLst/>
+                <a:latin typeface="Consolas" panose="020B0609020204030204" pitchFamily="49" charset="0"/>
+              </a:rPr>
+              <a:t> </a:t>
+            </a:r>
+            <a:r>
+              <a:rPr lang="fr-FR" sz="1800" b="0" dirty="0">
+                <a:solidFill>
+                  <a:srgbClr val="6F42C1"/>
+                </a:solidFill>
+                <a:effectLst/>
+                <a:latin typeface="Consolas" panose="020B0609020204030204" pitchFamily="49" charset="0"/>
+              </a:rPr>
+              <a:t>&lt;&lt;</a:t>
+            </a:r>
+            <a:r>
+              <a:rPr lang="fr-FR" sz="1800" b="0" dirty="0">
+                <a:solidFill>
+                  <a:srgbClr val="24292E"/>
+                </a:solidFill>
+                <a:effectLst/>
+                <a:latin typeface="Consolas" panose="020B0609020204030204" pitchFamily="49" charset="0"/>
+              </a:rPr>
+              <a:t> </a:t>
+            </a:r>
+            <a:r>
+              <a:rPr lang="fr-FR" sz="1800" b="0" dirty="0">
+                <a:solidFill>
+                  <a:srgbClr val="D73A49"/>
+                </a:solidFill>
+                <a:effectLst/>
+                <a:latin typeface="Consolas" panose="020B0609020204030204" pitchFamily="49" charset="0"/>
+              </a:rPr>
+              <a:t>--</a:t>
+            </a:r>
+            <a:r>
+              <a:rPr lang="fr-FR" sz="1800" b="0" dirty="0">
+                <a:solidFill>
+                  <a:srgbClr val="24292E"/>
+                </a:solidFill>
+                <a:effectLst/>
+                <a:latin typeface="Consolas" panose="020B0609020204030204" pitchFamily="49" charset="0"/>
+              </a:rPr>
+              <a:t>count </a:t>
+            </a:r>
+            <a:r>
+              <a:rPr lang="fr-FR" sz="1800" b="0" dirty="0">
+                <a:solidFill>
+                  <a:srgbClr val="6F42C1"/>
+                </a:solidFill>
+                <a:effectLst/>
+                <a:latin typeface="Consolas" panose="020B0609020204030204" pitchFamily="49" charset="0"/>
+              </a:rPr>
+              <a:t>&lt;&lt;</a:t>
+            </a:r>
+            <a:r>
+              <a:rPr lang="fr-FR" sz="1800" b="0" dirty="0">
+                <a:solidFill>
+                  <a:srgbClr val="24292E"/>
+                </a:solidFill>
+                <a:effectLst/>
+                <a:latin typeface="Consolas" panose="020B0609020204030204" pitchFamily="49" charset="0"/>
+              </a:rPr>
+              <a:t> </a:t>
+            </a:r>
+            <a:r>
+              <a:rPr lang="fr-FR" sz="1800" b="0" dirty="0">
+                <a:solidFill>
+                  <a:srgbClr val="032F62"/>
+                </a:solidFill>
+                <a:effectLst/>
+                <a:latin typeface="Consolas" panose="020B0609020204030204" pitchFamily="49" charset="0"/>
+              </a:rPr>
+              <a:t>" objet(s)</a:t>
+            </a:r>
+            <a:r>
+              <a:rPr lang="fr-FR" sz="1800" b="0" dirty="0">
+                <a:solidFill>
+                  <a:srgbClr val="005CC5"/>
+                </a:solidFill>
+                <a:effectLst/>
+                <a:latin typeface="Consolas" panose="020B0609020204030204" pitchFamily="49" charset="0"/>
+              </a:rPr>
+              <a:t>\n</a:t>
+            </a:r>
+            <a:r>
+              <a:rPr lang="fr-FR" sz="1800" b="0" dirty="0">
+                <a:solidFill>
+                  <a:srgbClr val="032F62"/>
+                </a:solidFill>
+                <a:effectLst/>
+                <a:latin typeface="Consolas" panose="020B0609020204030204" pitchFamily="49" charset="0"/>
+              </a:rPr>
+              <a:t>"</a:t>
+            </a:r>
+            <a:r>
+              <a:rPr lang="fr-FR" sz="1800" b="0" dirty="0">
+                <a:solidFill>
+                  <a:srgbClr val="24292E"/>
+                </a:solidFill>
+                <a:effectLst/>
+                <a:latin typeface="Consolas" panose="020B0609020204030204" pitchFamily="49" charset="0"/>
+              </a:rPr>
+              <a:t>;</a:t>
+            </a:r>
+          </a:p>
+          <a:p>
+            <a:pPr marL="0" indent="0">
+              <a:buNone/>
+            </a:pPr>
+            <a:r>
+              <a:rPr lang="fr-FR" sz="2400" b="0" dirty="0">
+                <a:solidFill>
+                  <a:srgbClr val="24292E"/>
+                </a:solidFill>
+                <a:effectLst/>
+                <a:latin typeface="Consolas" panose="020B0609020204030204" pitchFamily="49" charset="0"/>
+              </a:rPr>
+              <a:t>}</a:t>
+            </a:r>
+          </a:p>
+          <a:p>
+            <a:pPr marL="0" indent="0">
+              <a:buNone/>
+            </a:pPr>
+            <a:endParaRPr lang="fr-FR" sz="2400" b="0" dirty="0">
+              <a:solidFill>
+                <a:srgbClr val="24292E"/>
+              </a:solidFill>
+              <a:effectLst/>
+              <a:latin typeface="Consolas" panose="020B0609020204030204" pitchFamily="49" charset="0"/>
+            </a:endParaRPr>
+          </a:p>
+        </p:txBody>
+      </p:sp>
+    </p:spTree>
+    <p:extLst>
+      <p:ext uri="{BB962C8B-B14F-4D97-AF65-F5344CB8AC3E}">
+        <p14:creationId xmlns:p14="http://schemas.microsoft.com/office/powerpoint/2010/main" val="884101245"/>
+      </p:ext>
+    </p:extLst>
+  </p:cSld>
+  <p:clrMapOvr>
+    <a:masterClrMapping/>
+  </p:clrMapOvr>
+</p:sld>
+</file>
+
+<file path=ppt/slides/slide21.xml><?xml version="1.0" encoding="utf-8"?>
+<p:sld xmlns:a="http://schemas.openxmlformats.org/drawingml/2006/main" xmlns:r="http://schemas.openxmlformats.org/officeDocument/2006/relationships" xmlns:p="http://schemas.openxmlformats.org/presentationml/2006/main">
+  <p:cSld>
+    <p:spTree>
+      <p:nvGrpSpPr>
+        <p:cNvPr id="1" name=""/>
+        <p:cNvGrpSpPr/>
+        <p:nvPr/>
+      </p:nvGrpSpPr>
+      <p:grpSpPr>
+        <a:xfrm>
+          <a:off x="0" y="0"/>
+          <a:ext cx="0" cy="0"/>
+          <a:chOff x="0" y="0"/>
+          <a:chExt cx="0" cy="0"/>
+        </a:xfrm>
+      </p:grpSpPr>
+      <p:sp>
+        <p:nvSpPr>
+          <p:cNvPr id="3" name="Espace réservé du contenu 2">
+            <a:extLst>
+              <a:ext uri="{FF2B5EF4-FFF2-40B4-BE49-F238E27FC236}">
+                <a16:creationId xmlns:a16="http://schemas.microsoft.com/office/drawing/2014/main" id="{A41F34DA-DB20-47C7-B42D-04BDED91DC6F}"/>
+              </a:ext>
+            </a:extLst>
+          </p:cNvPr>
+          <p:cNvSpPr>
+            <a:spLocks noGrp="1"/>
+          </p:cNvSpPr>
+          <p:nvPr>
+            <p:ph idx="1"/>
+          </p:nvPr>
+        </p:nvSpPr>
+        <p:spPr>
+          <a:xfrm>
+            <a:off x="838200" y="572655"/>
+            <a:ext cx="10515600" cy="5604308"/>
+          </a:xfrm>
+        </p:spPr>
+        <p:txBody>
+          <a:bodyPr>
+            <a:normAutofit lnSpcReduction="10000"/>
+          </a:bodyPr>
+          <a:lstStyle/>
+          <a:p>
+            <a:pPr marL="0" indent="0">
+              <a:buNone/>
+            </a:pPr>
+            <a:r>
+              <a:rPr lang="fr-FR" sz="2400" b="0" dirty="0">
+                <a:solidFill>
+                  <a:srgbClr val="6A737D"/>
+                </a:solidFill>
+                <a:effectLst/>
+                <a:latin typeface="Consolas" panose="020B0609020204030204" pitchFamily="49" charset="0"/>
+              </a:rPr>
+              <a:t>// Fonction qui crée 2 objets</a:t>
+            </a:r>
+            <a:endParaRPr lang="fr-FR" sz="2400" b="0" dirty="0">
+              <a:solidFill>
+                <a:srgbClr val="24292E"/>
+              </a:solidFill>
+              <a:effectLst/>
+              <a:latin typeface="Consolas" panose="020B0609020204030204" pitchFamily="49" charset="0"/>
+            </a:endParaRPr>
+          </a:p>
+          <a:p>
+            <a:pPr marL="0" indent="0">
+              <a:buNone/>
+            </a:pPr>
+            <a:r>
+              <a:rPr lang="fr-FR" sz="2400" b="0" dirty="0" err="1">
+                <a:solidFill>
+                  <a:srgbClr val="D73A49"/>
+                </a:solidFill>
+                <a:effectLst/>
+                <a:latin typeface="Consolas" panose="020B0609020204030204" pitchFamily="49" charset="0"/>
+              </a:rPr>
+              <a:t>void</a:t>
+            </a:r>
+            <a:r>
+              <a:rPr lang="fr-FR" sz="2400" b="0" dirty="0">
+                <a:solidFill>
+                  <a:srgbClr val="24292E"/>
+                </a:solidFill>
+                <a:effectLst/>
+                <a:latin typeface="Consolas" panose="020B0609020204030204" pitchFamily="49" charset="0"/>
+              </a:rPr>
+              <a:t> </a:t>
+            </a:r>
+            <a:r>
+              <a:rPr lang="fr-FR" sz="2400" b="0" dirty="0" err="1">
+                <a:solidFill>
+                  <a:srgbClr val="6F42C1"/>
+                </a:solidFill>
+                <a:effectLst/>
+                <a:latin typeface="Consolas" panose="020B0609020204030204" pitchFamily="49" charset="0"/>
+              </a:rPr>
+              <a:t>Creation</a:t>
+            </a:r>
+            <a:r>
+              <a:rPr lang="fr-FR" sz="2400" b="0" dirty="0">
+                <a:solidFill>
+                  <a:srgbClr val="24292E"/>
+                </a:solidFill>
+                <a:effectLst/>
+                <a:latin typeface="Consolas" panose="020B0609020204030204" pitchFamily="49" charset="0"/>
+              </a:rPr>
+              <a:t>() {  </a:t>
+            </a:r>
+          </a:p>
+          <a:p>
+            <a:pPr marL="0" indent="0">
+              <a:buNone/>
+            </a:pPr>
+            <a:r>
+              <a:rPr lang="fr-FR" sz="2400" b="0" dirty="0">
+                <a:solidFill>
+                  <a:srgbClr val="24292E"/>
+                </a:solidFill>
+                <a:effectLst/>
+                <a:latin typeface="Consolas" panose="020B0609020204030204" pitchFamily="49" charset="0"/>
+              </a:rPr>
+              <a:t>    </a:t>
+            </a:r>
+            <a:r>
+              <a:rPr lang="fr-FR" sz="2400" b="0" dirty="0" err="1">
+                <a:solidFill>
+                  <a:srgbClr val="6F42C1"/>
+                </a:solidFill>
+                <a:effectLst/>
+                <a:latin typeface="Consolas" panose="020B0609020204030204" pitchFamily="49" charset="0"/>
+              </a:rPr>
+              <a:t>ObjectCounter</a:t>
+            </a:r>
+            <a:r>
+              <a:rPr lang="fr-FR" sz="2400" b="0" dirty="0">
+                <a:solidFill>
+                  <a:srgbClr val="24292E"/>
+                </a:solidFill>
+                <a:effectLst/>
+                <a:latin typeface="Consolas" panose="020B0609020204030204" pitchFamily="49" charset="0"/>
+              </a:rPr>
+              <a:t> </a:t>
+            </a:r>
+            <a:r>
+              <a:rPr lang="fr-FR" sz="2400" b="0" dirty="0" err="1">
+                <a:solidFill>
+                  <a:srgbClr val="24292E"/>
+                </a:solidFill>
+                <a:effectLst/>
+                <a:latin typeface="Consolas" panose="020B0609020204030204" pitchFamily="49" charset="0"/>
+              </a:rPr>
+              <a:t>u,v</a:t>
+            </a:r>
+            <a:r>
+              <a:rPr lang="fr-FR" sz="2400" b="0" dirty="0">
+                <a:solidFill>
+                  <a:srgbClr val="24292E"/>
+                </a:solidFill>
+                <a:effectLst/>
+                <a:latin typeface="Consolas" panose="020B0609020204030204" pitchFamily="49" charset="0"/>
+              </a:rPr>
+              <a:t>;</a:t>
+            </a:r>
+          </a:p>
+          <a:p>
+            <a:pPr marL="0" indent="0">
+              <a:buNone/>
+            </a:pPr>
+            <a:r>
+              <a:rPr lang="fr-FR" sz="2400" b="0" dirty="0">
+                <a:solidFill>
+                  <a:srgbClr val="24292E"/>
+                </a:solidFill>
+                <a:effectLst/>
+                <a:latin typeface="Consolas" panose="020B0609020204030204" pitchFamily="49" charset="0"/>
+              </a:rPr>
+              <a:t>    cout </a:t>
+            </a:r>
+            <a:r>
+              <a:rPr lang="fr-FR" sz="2400" b="0" dirty="0">
+                <a:solidFill>
+                  <a:srgbClr val="6F42C1"/>
+                </a:solidFill>
+                <a:effectLst/>
+                <a:latin typeface="Consolas" panose="020B0609020204030204" pitchFamily="49" charset="0"/>
+              </a:rPr>
+              <a:t>&lt;&lt;</a:t>
+            </a:r>
+            <a:r>
+              <a:rPr lang="fr-FR" sz="2400" b="0" dirty="0">
+                <a:solidFill>
+                  <a:srgbClr val="24292E"/>
+                </a:solidFill>
+                <a:effectLst/>
+                <a:latin typeface="Consolas" panose="020B0609020204030204" pitchFamily="49" charset="0"/>
+              </a:rPr>
+              <a:t> </a:t>
+            </a:r>
+            <a:r>
+              <a:rPr lang="fr-FR" sz="2400" b="0" dirty="0">
+                <a:solidFill>
+                  <a:srgbClr val="032F62"/>
+                </a:solidFill>
+                <a:effectLst/>
+                <a:latin typeface="Consolas" panose="020B0609020204030204" pitchFamily="49" charset="0"/>
+              </a:rPr>
+              <a:t>"sortie de la fonction</a:t>
+            </a:r>
+            <a:r>
+              <a:rPr lang="fr-FR" sz="2400" b="0" dirty="0">
+                <a:solidFill>
+                  <a:srgbClr val="005CC5"/>
+                </a:solidFill>
+                <a:effectLst/>
+                <a:latin typeface="Consolas" panose="020B0609020204030204" pitchFamily="49" charset="0"/>
+              </a:rPr>
+              <a:t>\n</a:t>
+            </a:r>
+            <a:r>
+              <a:rPr lang="fr-FR" sz="2400" b="0" dirty="0">
+                <a:solidFill>
+                  <a:srgbClr val="032F62"/>
+                </a:solidFill>
+                <a:effectLst/>
+                <a:latin typeface="Consolas" panose="020B0609020204030204" pitchFamily="49" charset="0"/>
+              </a:rPr>
+              <a:t>"</a:t>
+            </a:r>
+            <a:r>
+              <a:rPr lang="fr-FR" sz="2400" b="0" dirty="0">
+                <a:solidFill>
+                  <a:srgbClr val="24292E"/>
+                </a:solidFill>
+                <a:effectLst/>
+                <a:latin typeface="Consolas" panose="020B0609020204030204" pitchFamily="49" charset="0"/>
+              </a:rPr>
+              <a:t>;</a:t>
+            </a:r>
+          </a:p>
+          <a:p>
+            <a:pPr marL="0" indent="0">
+              <a:buNone/>
+            </a:pPr>
+            <a:r>
+              <a:rPr lang="fr-FR" sz="2400" b="0" dirty="0">
+                <a:solidFill>
+                  <a:srgbClr val="24292E"/>
+                </a:solidFill>
+                <a:effectLst/>
+                <a:latin typeface="Consolas" panose="020B0609020204030204" pitchFamily="49" charset="0"/>
+              </a:rPr>
+              <a:t>}</a:t>
+            </a:r>
+          </a:p>
+          <a:p>
+            <a:pPr marL="0" indent="0">
+              <a:buNone/>
+            </a:pPr>
+            <a:endParaRPr lang="fr-FR" sz="2400" b="0" dirty="0">
+              <a:solidFill>
+                <a:srgbClr val="24292E"/>
+              </a:solidFill>
+              <a:effectLst/>
+              <a:latin typeface="Consolas" panose="020B0609020204030204" pitchFamily="49" charset="0"/>
+            </a:endParaRPr>
+          </a:p>
+          <a:p>
+            <a:pPr marL="0" indent="0">
+              <a:buNone/>
+            </a:pPr>
+            <a:r>
+              <a:rPr lang="fr-FR" sz="2400" b="0" dirty="0" err="1">
+                <a:solidFill>
+                  <a:srgbClr val="D73A49"/>
+                </a:solidFill>
+                <a:effectLst/>
+                <a:latin typeface="Consolas" panose="020B0609020204030204" pitchFamily="49" charset="0"/>
+              </a:rPr>
+              <a:t>int</a:t>
+            </a:r>
+            <a:r>
+              <a:rPr lang="fr-FR" sz="2400" b="0" dirty="0">
+                <a:solidFill>
+                  <a:srgbClr val="24292E"/>
+                </a:solidFill>
+                <a:effectLst/>
+                <a:latin typeface="Consolas" panose="020B0609020204030204" pitchFamily="49" charset="0"/>
+              </a:rPr>
+              <a:t> </a:t>
+            </a:r>
+            <a:r>
+              <a:rPr lang="fr-FR" sz="2400" b="0" dirty="0">
+                <a:solidFill>
+                  <a:srgbClr val="6F42C1"/>
+                </a:solidFill>
+                <a:effectLst/>
+                <a:latin typeface="Consolas" panose="020B0609020204030204" pitchFamily="49" charset="0"/>
+              </a:rPr>
+              <a:t>main</a:t>
+            </a:r>
+            <a:r>
+              <a:rPr lang="fr-FR" sz="2400" b="0" dirty="0">
+                <a:solidFill>
+                  <a:srgbClr val="24292E"/>
+                </a:solidFill>
+                <a:effectLst/>
+                <a:latin typeface="Consolas" panose="020B0609020204030204" pitchFamily="49" charset="0"/>
+              </a:rPr>
+              <a:t>() {  </a:t>
+            </a:r>
+          </a:p>
+          <a:p>
+            <a:pPr marL="0" indent="0">
+              <a:buNone/>
+            </a:pPr>
+            <a:r>
+              <a:rPr lang="fr-FR" sz="2400" b="0" dirty="0">
+                <a:solidFill>
+                  <a:srgbClr val="24292E"/>
+                </a:solidFill>
+                <a:effectLst/>
+                <a:latin typeface="Consolas" panose="020B0609020204030204" pitchFamily="49" charset="0"/>
+              </a:rPr>
+              <a:t>    </a:t>
+            </a:r>
+            <a:r>
+              <a:rPr lang="fr-FR" sz="2400" b="0" dirty="0" err="1">
+                <a:solidFill>
+                  <a:srgbClr val="6F42C1"/>
+                </a:solidFill>
+                <a:effectLst/>
+                <a:latin typeface="Consolas" panose="020B0609020204030204" pitchFamily="49" charset="0"/>
+              </a:rPr>
+              <a:t>ObjectCounter</a:t>
+            </a:r>
+            <a:r>
+              <a:rPr lang="fr-FR" sz="2400" b="0" dirty="0">
+                <a:solidFill>
+                  <a:srgbClr val="24292E"/>
+                </a:solidFill>
+                <a:effectLst/>
+                <a:latin typeface="Consolas" panose="020B0609020204030204" pitchFamily="49" charset="0"/>
+              </a:rPr>
+              <a:t> a;</a:t>
+            </a:r>
+            <a:r>
+              <a:rPr lang="fr-FR" sz="2400" b="0" dirty="0">
+                <a:solidFill>
+                  <a:srgbClr val="6A737D"/>
+                </a:solidFill>
+                <a:effectLst/>
+                <a:latin typeface="Consolas" panose="020B0609020204030204" pitchFamily="49" charset="0"/>
+              </a:rPr>
+              <a:t>    // Le constructeur crée 1 objet</a:t>
+            </a:r>
+            <a:endParaRPr lang="fr-FR" sz="2400" b="0" dirty="0">
+              <a:solidFill>
+                <a:srgbClr val="24292E"/>
+              </a:solidFill>
+              <a:effectLst/>
+              <a:latin typeface="Consolas" panose="020B0609020204030204" pitchFamily="49" charset="0"/>
+            </a:endParaRPr>
+          </a:p>
+          <a:p>
+            <a:pPr marL="0" indent="0">
+              <a:buNone/>
+            </a:pPr>
+            <a:r>
+              <a:rPr lang="fr-FR" sz="2400" b="0" dirty="0">
+                <a:solidFill>
+                  <a:srgbClr val="24292E"/>
+                </a:solidFill>
+                <a:effectLst/>
+                <a:latin typeface="Consolas" panose="020B0609020204030204" pitchFamily="49" charset="0"/>
+              </a:rPr>
+              <a:t>    cout </a:t>
+            </a:r>
+            <a:r>
+              <a:rPr lang="fr-FR" sz="2400" b="0" dirty="0">
+                <a:solidFill>
+                  <a:srgbClr val="6F42C1"/>
+                </a:solidFill>
+                <a:effectLst/>
+                <a:latin typeface="Consolas" panose="020B0609020204030204" pitchFamily="49" charset="0"/>
+              </a:rPr>
+              <a:t>&lt;&lt;</a:t>
+            </a:r>
+            <a:r>
+              <a:rPr lang="fr-FR" sz="2400" b="0" dirty="0">
+                <a:solidFill>
+                  <a:srgbClr val="24292E"/>
+                </a:solidFill>
+                <a:effectLst/>
+                <a:latin typeface="Consolas" panose="020B0609020204030204" pitchFamily="49" charset="0"/>
+              </a:rPr>
+              <a:t> </a:t>
+            </a:r>
+            <a:r>
+              <a:rPr lang="fr-FR" sz="2400" b="0" dirty="0">
+                <a:solidFill>
+                  <a:srgbClr val="032F62"/>
+                </a:solidFill>
+                <a:effectLst/>
+                <a:latin typeface="Consolas" panose="020B0609020204030204" pitchFamily="49" charset="0"/>
+              </a:rPr>
+              <a:t>"appel de la fonction </a:t>
+            </a:r>
+            <a:r>
+              <a:rPr lang="fr-FR" sz="2400" b="0" dirty="0" err="1">
+                <a:solidFill>
+                  <a:srgbClr val="032F62"/>
+                </a:solidFill>
+                <a:effectLst/>
+                <a:latin typeface="Consolas" panose="020B0609020204030204" pitchFamily="49" charset="0"/>
+              </a:rPr>
+              <a:t>Creation</a:t>
+            </a:r>
+            <a:r>
+              <a:rPr lang="fr-FR" sz="2400" b="0" dirty="0">
+                <a:solidFill>
+                  <a:srgbClr val="005CC5"/>
+                </a:solidFill>
+                <a:effectLst/>
+                <a:latin typeface="Consolas" panose="020B0609020204030204" pitchFamily="49" charset="0"/>
+              </a:rPr>
+              <a:t>\n</a:t>
+            </a:r>
+            <a:r>
+              <a:rPr lang="fr-FR" sz="2400" b="0" dirty="0">
+                <a:solidFill>
+                  <a:srgbClr val="032F62"/>
+                </a:solidFill>
+                <a:effectLst/>
+                <a:latin typeface="Consolas" panose="020B0609020204030204" pitchFamily="49" charset="0"/>
+              </a:rPr>
+              <a:t>"</a:t>
+            </a:r>
+            <a:r>
+              <a:rPr lang="fr-FR" sz="2400" b="0" dirty="0">
+                <a:solidFill>
+                  <a:srgbClr val="24292E"/>
+                </a:solidFill>
+                <a:effectLst/>
+                <a:latin typeface="Consolas" panose="020B0609020204030204" pitchFamily="49" charset="0"/>
+              </a:rPr>
+              <a:t>;</a:t>
+            </a:r>
+          </a:p>
+          <a:p>
+            <a:pPr marL="0" indent="0">
+              <a:buNone/>
+            </a:pPr>
+            <a:r>
+              <a:rPr lang="fr-FR" sz="2400" b="0" dirty="0">
+                <a:solidFill>
+                  <a:srgbClr val="24292E"/>
+                </a:solidFill>
+                <a:effectLst/>
+                <a:latin typeface="Consolas" panose="020B0609020204030204" pitchFamily="49" charset="0"/>
+              </a:rPr>
+              <a:t>    </a:t>
+            </a:r>
+            <a:r>
+              <a:rPr lang="fr-FR" sz="2400" b="0" dirty="0" err="1">
+                <a:solidFill>
+                  <a:srgbClr val="6F42C1"/>
+                </a:solidFill>
+                <a:effectLst/>
+                <a:latin typeface="Consolas" panose="020B0609020204030204" pitchFamily="49" charset="0"/>
+              </a:rPr>
+              <a:t>Creation</a:t>
+            </a:r>
+            <a:r>
+              <a:rPr lang="fr-FR" sz="2400" b="0" dirty="0">
+                <a:solidFill>
+                  <a:srgbClr val="24292E"/>
+                </a:solidFill>
+                <a:effectLst/>
+                <a:latin typeface="Consolas" panose="020B0609020204030204" pitchFamily="49" charset="0"/>
+              </a:rPr>
+              <a:t>();</a:t>
+            </a:r>
+            <a:r>
+              <a:rPr lang="fr-FR" sz="2400" b="0" dirty="0">
+                <a:solidFill>
+                  <a:srgbClr val="6A737D"/>
+                </a:solidFill>
+                <a:effectLst/>
+                <a:latin typeface="Consolas" panose="020B0609020204030204" pitchFamily="49" charset="0"/>
+              </a:rPr>
+              <a:t>         // La fonction crée 2 objets</a:t>
+            </a:r>
+            <a:endParaRPr lang="fr-FR" sz="2400" b="0" dirty="0">
+              <a:solidFill>
+                <a:srgbClr val="24292E"/>
+              </a:solidFill>
+              <a:effectLst/>
+              <a:latin typeface="Consolas" panose="020B0609020204030204" pitchFamily="49" charset="0"/>
+            </a:endParaRPr>
+          </a:p>
+          <a:p>
+            <a:pPr marL="0" indent="0">
+              <a:buNone/>
+            </a:pPr>
+            <a:r>
+              <a:rPr lang="fr-FR" sz="2400" b="0" dirty="0">
+                <a:solidFill>
+                  <a:srgbClr val="24292E"/>
+                </a:solidFill>
+                <a:effectLst/>
+                <a:latin typeface="Consolas" panose="020B0609020204030204" pitchFamily="49" charset="0"/>
+              </a:rPr>
+              <a:t>    </a:t>
+            </a:r>
+            <a:r>
+              <a:rPr lang="fr-FR" sz="2400" b="0" dirty="0" err="1">
+                <a:solidFill>
+                  <a:srgbClr val="6F42C1"/>
+                </a:solidFill>
+                <a:effectLst/>
+                <a:latin typeface="Consolas" panose="020B0609020204030204" pitchFamily="49" charset="0"/>
+              </a:rPr>
+              <a:t>ObjectCounter</a:t>
+            </a:r>
+            <a:r>
+              <a:rPr lang="fr-FR" sz="2400" b="0" dirty="0">
+                <a:solidFill>
+                  <a:srgbClr val="24292E"/>
+                </a:solidFill>
+                <a:effectLst/>
+                <a:latin typeface="Consolas" panose="020B0609020204030204" pitchFamily="49" charset="0"/>
+              </a:rPr>
+              <a:t> b;</a:t>
+            </a:r>
+            <a:r>
+              <a:rPr lang="fr-FR" sz="2400" b="0" dirty="0">
+                <a:solidFill>
+                  <a:srgbClr val="6A737D"/>
+                </a:solidFill>
+                <a:effectLst/>
+                <a:latin typeface="Consolas" panose="020B0609020204030204" pitchFamily="49" charset="0"/>
+              </a:rPr>
+              <a:t>    // Le constructeur crée 1 objet</a:t>
+            </a:r>
+            <a:endParaRPr lang="fr-FR" sz="2400" b="0" dirty="0">
+              <a:solidFill>
+                <a:srgbClr val="24292E"/>
+              </a:solidFill>
+              <a:effectLst/>
+              <a:latin typeface="Consolas" panose="020B0609020204030204" pitchFamily="49" charset="0"/>
+            </a:endParaRPr>
+          </a:p>
+          <a:p>
+            <a:pPr marL="0" indent="0">
+              <a:buNone/>
+            </a:pPr>
+            <a:r>
+              <a:rPr lang="fr-FR" sz="2400" b="0" dirty="0">
+                <a:solidFill>
+                  <a:srgbClr val="24292E"/>
+                </a:solidFill>
+                <a:effectLst/>
+                <a:latin typeface="Consolas" panose="020B0609020204030204" pitchFamily="49" charset="0"/>
+              </a:rPr>
+              <a:t>    </a:t>
+            </a:r>
+            <a:r>
+              <a:rPr lang="fr-FR" sz="2400" b="0" dirty="0">
+                <a:solidFill>
+                  <a:srgbClr val="D73A49"/>
+                </a:solidFill>
+                <a:effectLst/>
+                <a:latin typeface="Consolas" panose="020B0609020204030204" pitchFamily="49" charset="0"/>
+              </a:rPr>
+              <a:t>return</a:t>
+            </a:r>
+            <a:r>
+              <a:rPr lang="fr-FR" sz="2400" b="0" dirty="0">
+                <a:solidFill>
+                  <a:srgbClr val="24292E"/>
+                </a:solidFill>
+                <a:effectLst/>
+                <a:latin typeface="Consolas" panose="020B0609020204030204" pitchFamily="49" charset="0"/>
+              </a:rPr>
+              <a:t> </a:t>
+            </a:r>
+            <a:r>
+              <a:rPr lang="fr-FR" sz="2400" b="0" dirty="0">
+                <a:solidFill>
+                  <a:srgbClr val="005CC5"/>
+                </a:solidFill>
+                <a:effectLst/>
+                <a:latin typeface="Consolas" panose="020B0609020204030204" pitchFamily="49" charset="0"/>
+              </a:rPr>
+              <a:t>0</a:t>
+            </a:r>
+            <a:r>
+              <a:rPr lang="fr-FR" sz="2400" b="0" dirty="0">
+                <a:solidFill>
+                  <a:srgbClr val="24292E"/>
+                </a:solidFill>
+                <a:effectLst/>
+                <a:latin typeface="Consolas" panose="020B0609020204030204" pitchFamily="49" charset="0"/>
+              </a:rPr>
+              <a:t> ;</a:t>
+            </a:r>
+          </a:p>
+          <a:p>
+            <a:pPr marL="0" indent="0">
+              <a:buNone/>
+            </a:pPr>
+            <a:r>
+              <a:rPr lang="fr-FR" sz="2400" b="0" dirty="0">
+                <a:solidFill>
+                  <a:srgbClr val="24292E"/>
+                </a:solidFill>
+                <a:effectLst/>
+                <a:latin typeface="Consolas" panose="020B0609020204030204" pitchFamily="49" charset="0"/>
+              </a:rPr>
+              <a:t>}</a:t>
+            </a:r>
+          </a:p>
+          <a:p>
+            <a:pPr marL="0" indent="0">
+              <a:buNone/>
+            </a:pPr>
+            <a:endParaRPr lang="fr-FR" sz="2400" b="0" dirty="0">
+              <a:solidFill>
+                <a:srgbClr val="24292E"/>
+              </a:solidFill>
+              <a:effectLst/>
+              <a:latin typeface="Consolas" panose="020B0609020204030204" pitchFamily="49" charset="0"/>
+            </a:endParaRPr>
+          </a:p>
+        </p:txBody>
+      </p:sp>
+    </p:spTree>
+    <p:extLst>
+      <p:ext uri="{BB962C8B-B14F-4D97-AF65-F5344CB8AC3E}">
+        <p14:creationId xmlns:p14="http://schemas.microsoft.com/office/powerpoint/2010/main" val="2720426174"/>
+      </p:ext>
+    </p:extLst>
+  </p:cSld>
+  <p:clrMapOvr>
+    <a:masterClrMapping/>
+  </p:clrMapOvr>
+</p:sld>
+</file>
+
+<file path=ppt/slides/slide22.xml><?xml version="1.0" encoding="utf-8"?>
+<p:sld xmlns:a="http://schemas.openxmlformats.org/drawingml/2006/main" xmlns:r="http://schemas.openxmlformats.org/officeDocument/2006/relationships" xmlns:p="http://schemas.openxmlformats.org/presentationml/2006/main">
+  <p:cSld>
+    <p:spTree>
+      <p:nvGrpSpPr>
+        <p:cNvPr id="1" name=""/>
+        <p:cNvGrpSpPr/>
+        <p:nvPr/>
+      </p:nvGrpSpPr>
+      <p:grpSpPr>
+        <a:xfrm>
+          <a:off x="0" y="0"/>
+          <a:ext cx="0" cy="0"/>
+          <a:chOff x="0" y="0"/>
+          <a:chExt cx="0" cy="0"/>
+        </a:xfrm>
+      </p:grpSpPr>
+      <p:sp>
+        <p:nvSpPr>
+          <p:cNvPr id="3" name="Espace réservé du contenu 2">
+            <a:extLst>
+              <a:ext uri="{FF2B5EF4-FFF2-40B4-BE49-F238E27FC236}">
+                <a16:creationId xmlns:a16="http://schemas.microsoft.com/office/drawing/2014/main" id="{A41F34DA-DB20-47C7-B42D-04BDED91DC6F}"/>
+              </a:ext>
+            </a:extLst>
+          </p:cNvPr>
+          <p:cNvSpPr>
+            <a:spLocks noGrp="1"/>
+          </p:cNvSpPr>
+          <p:nvPr>
+            <p:ph idx="1"/>
+          </p:nvPr>
+        </p:nvSpPr>
+        <p:spPr>
+          <a:xfrm>
+            <a:off x="838200" y="572655"/>
+            <a:ext cx="10515600" cy="5604308"/>
+          </a:xfrm>
+        </p:spPr>
+        <p:txBody>
+          <a:bodyPr>
+            <a:normAutofit/>
+          </a:bodyPr>
+          <a:lstStyle/>
+          <a:p>
+            <a:pPr marL="0" indent="0">
+              <a:buNone/>
+            </a:pPr>
+            <a:r>
+              <a:rPr lang="fr-FR" sz="2400" b="0" dirty="0">
+                <a:solidFill>
+                  <a:srgbClr val="24292E"/>
+                </a:solidFill>
+                <a:effectLst/>
+                <a:latin typeface="Consolas" panose="020B0609020204030204" pitchFamily="49" charset="0"/>
+              </a:rPr>
+              <a:t>++ construction : il y a maintenant 1 objet(s)</a:t>
+            </a:r>
+          </a:p>
+          <a:p>
+            <a:pPr marL="0" indent="0">
+              <a:buNone/>
+            </a:pPr>
+            <a:r>
+              <a:rPr lang="fr-FR" sz="2400" b="0" dirty="0">
+                <a:solidFill>
+                  <a:srgbClr val="24292E"/>
+                </a:solidFill>
+                <a:effectLst/>
+                <a:latin typeface="Consolas" panose="020B0609020204030204" pitchFamily="49" charset="0"/>
+              </a:rPr>
+              <a:t>appel de la fonction </a:t>
+            </a:r>
+            <a:r>
+              <a:rPr lang="fr-FR" sz="2400" b="0" dirty="0" err="1">
+                <a:solidFill>
+                  <a:srgbClr val="24292E"/>
+                </a:solidFill>
+                <a:effectLst/>
+                <a:latin typeface="Consolas" panose="020B0609020204030204" pitchFamily="49" charset="0"/>
+              </a:rPr>
+              <a:t>Creation</a:t>
+            </a:r>
+            <a:endParaRPr lang="fr-FR" sz="2400" b="0" dirty="0">
+              <a:solidFill>
+                <a:srgbClr val="24292E"/>
+              </a:solidFill>
+              <a:effectLst/>
+              <a:latin typeface="Consolas" panose="020B0609020204030204" pitchFamily="49" charset="0"/>
+            </a:endParaRPr>
+          </a:p>
+          <a:p>
+            <a:pPr marL="0" indent="0">
+              <a:buNone/>
+            </a:pPr>
+            <a:r>
+              <a:rPr lang="fr-FR" sz="2400" b="0" dirty="0">
+                <a:solidFill>
+                  <a:srgbClr val="24292E"/>
+                </a:solidFill>
+                <a:effectLst/>
+                <a:latin typeface="Consolas" panose="020B0609020204030204" pitchFamily="49" charset="0"/>
+              </a:rPr>
+              <a:t>++ construction : il y a maintenant 2 objet(s)</a:t>
+            </a:r>
+          </a:p>
+          <a:p>
+            <a:pPr marL="0" indent="0">
+              <a:buNone/>
+            </a:pPr>
+            <a:r>
+              <a:rPr lang="fr-FR" sz="2400" b="0" dirty="0">
+                <a:solidFill>
+                  <a:srgbClr val="24292E"/>
+                </a:solidFill>
+                <a:effectLst/>
+                <a:latin typeface="Consolas" panose="020B0609020204030204" pitchFamily="49" charset="0"/>
+              </a:rPr>
+              <a:t>++ construction : il y a maintenant 3 objet(s)</a:t>
+            </a:r>
+          </a:p>
+          <a:p>
+            <a:pPr marL="0" indent="0">
+              <a:buNone/>
+            </a:pPr>
+            <a:r>
+              <a:rPr lang="fr-FR" sz="2400" b="0" dirty="0">
+                <a:solidFill>
+                  <a:srgbClr val="24292E"/>
+                </a:solidFill>
+                <a:effectLst/>
+                <a:latin typeface="Consolas" panose="020B0609020204030204" pitchFamily="49" charset="0"/>
+              </a:rPr>
+              <a:t>sortie de la fonction</a:t>
+            </a:r>
+          </a:p>
+          <a:p>
+            <a:pPr marL="0" indent="0">
+              <a:buNone/>
+            </a:pPr>
+            <a:r>
+              <a:rPr lang="fr-FR" sz="2400" b="0" dirty="0">
+                <a:solidFill>
+                  <a:srgbClr val="24292E"/>
+                </a:solidFill>
+                <a:effectLst/>
+                <a:latin typeface="Consolas" panose="020B0609020204030204" pitchFamily="49" charset="0"/>
+              </a:rPr>
+              <a:t>-- destruction : il y a maintenant 2 objet(s)</a:t>
+            </a:r>
+          </a:p>
+          <a:p>
+            <a:pPr marL="0" indent="0">
+              <a:buNone/>
+            </a:pPr>
+            <a:r>
+              <a:rPr lang="fr-FR" sz="2400" b="0" dirty="0">
+                <a:solidFill>
+                  <a:srgbClr val="24292E"/>
+                </a:solidFill>
+                <a:effectLst/>
+                <a:latin typeface="Consolas" panose="020B0609020204030204" pitchFamily="49" charset="0"/>
+              </a:rPr>
+              <a:t>-- destruction : il y a maintenant 1 objet(s)</a:t>
+            </a:r>
+          </a:p>
+          <a:p>
+            <a:pPr marL="0" indent="0">
+              <a:buNone/>
+            </a:pPr>
+            <a:r>
+              <a:rPr lang="fr-FR" sz="2400" b="0" dirty="0">
+                <a:solidFill>
+                  <a:srgbClr val="24292E"/>
+                </a:solidFill>
+                <a:effectLst/>
+                <a:latin typeface="Consolas" panose="020B0609020204030204" pitchFamily="49" charset="0"/>
+              </a:rPr>
+              <a:t>++ construction : il y a maintenant 2 objet(s)</a:t>
+            </a:r>
+          </a:p>
+          <a:p>
+            <a:pPr marL="0" indent="0">
+              <a:buNone/>
+            </a:pPr>
+            <a:r>
+              <a:rPr lang="fr-FR" sz="2400" b="0" dirty="0">
+                <a:solidFill>
+                  <a:srgbClr val="24292E"/>
+                </a:solidFill>
+                <a:effectLst/>
+                <a:latin typeface="Consolas" panose="020B0609020204030204" pitchFamily="49" charset="0"/>
+              </a:rPr>
+              <a:t>-- destruction : il y a maintenant 1 objet(s)</a:t>
+            </a:r>
+          </a:p>
+          <a:p>
+            <a:pPr marL="0" indent="0">
+              <a:buNone/>
+            </a:pPr>
+            <a:r>
+              <a:rPr lang="fr-FR" sz="2400" b="0" dirty="0">
+                <a:solidFill>
+                  <a:srgbClr val="24292E"/>
+                </a:solidFill>
+                <a:effectLst/>
+                <a:latin typeface="Consolas" panose="020B0609020204030204" pitchFamily="49" charset="0"/>
+              </a:rPr>
+              <a:t>-- destruction : il y a maintenant 0 objet(s)</a:t>
+            </a:r>
+          </a:p>
+        </p:txBody>
+      </p:sp>
+    </p:spTree>
+    <p:extLst>
+      <p:ext uri="{BB962C8B-B14F-4D97-AF65-F5344CB8AC3E}">
+        <p14:creationId xmlns:p14="http://schemas.microsoft.com/office/powerpoint/2010/main" val="4021109877"/>
       </p:ext>
     </p:extLst>
   </p:cSld>

</xml_diff>